<commit_message>
intro slides - create 3 example problems
problem 1 - image blurring
problem 2 - simple beam problem, direct and inverse
problem 3 - simple beam problem with two materials

in addition, add more detail to definition slides
</commit_message>
<xml_diff>
--- a/1-Bridge-Problem/1-Bridge-Problem.pptx
+++ b/1-Bridge-Problem/1-Bridge-Problem.pptx
@@ -5,15 +5,16 @@
     <p:sldMasterId id="2147483648" r:id="rId1"/>
   </p:sldMasterIdLst>
   <p:notesMasterIdLst>
-    <p:notesMasterId r:id="rId5"/>
+    <p:notesMasterId r:id="rId6"/>
   </p:notesMasterIdLst>
   <p:handoutMasterIdLst>
-    <p:handoutMasterId r:id="rId6"/>
+    <p:handoutMasterId r:id="rId7"/>
   </p:handoutMasterIdLst>
   <p:sldIdLst>
     <p:sldId id="256" r:id="rId2"/>
     <p:sldId id="257" r:id="rId3"/>
-    <p:sldId id="258" r:id="rId4"/>
+    <p:sldId id="260" r:id="rId4"/>
+    <p:sldId id="258" r:id="rId5"/>
   </p:sldIdLst>
   <p:sldSz cx="12192000" cy="6858000"/>
   <p:notesSz cx="6858000" cy="9144000"/>
@@ -358,7 +359,7 @@
           <a:p>
             <a:fld id="{26E7365E-7303-4AD9-8FBF-4B173A7D9DED}" type="datetimeFigureOut">
               <a:rPr lang="en-US" smtClean="0"/>
-              <a:t>1/22/2026</a:t>
+              <a:t>1/28/2026</a:t>
             </a:fld>
             <a:endParaRPr lang="en-US"/>
           </a:p>
@@ -536,7 +537,7 @@
           <a:p>
             <a:fld id="{812898FD-25D5-4BC2-95FB-0E9BA7ACA22E}" type="datetimeFigureOut">
               <a:rPr lang="en-US" smtClean="0"/>
-              <a:t>1/22/2026</a:t>
+              <a:t>1/28/2026</a:t>
             </a:fld>
             <a:endParaRPr lang="en-US"/>
           </a:p>
@@ -4425,36 +4426,8 @@
           <a:p>
             <a:r>
               <a:rPr lang="en-US" dirty="0"/>
-              <a:t>The Well-Posed Beam Problem</a:t>
+              <a:t>Simple Beam Problem</a:t>
             </a:r>
-          </a:p>
-        </p:txBody>
-      </p:sp>
-      <p:sp>
-        <p:nvSpPr>
-          <p:cNvPr id="3" name="Content Placeholder 2">
-            <a:extLst>
-              <a:ext uri="{FF2B5EF4-FFF2-40B4-BE49-F238E27FC236}">
-                <a16:creationId xmlns:a16="http://schemas.microsoft.com/office/drawing/2014/main" id="{75D931D5-EACD-FEF6-3CF2-2D2C006EBAB6}"/>
-              </a:ext>
-            </a:extLst>
-          </p:cNvPr>
-          <p:cNvSpPr>
-            <a:spLocks noGrp="1"/>
-          </p:cNvSpPr>
-          <p:nvPr>
-            <p:ph idx="1"/>
-          </p:nvPr>
-        </p:nvSpPr>
-        <p:spPr/>
-        <p:txBody>
-          <a:bodyPr/>
-          <a:lstStyle/>
-          <a:p>
-            <a:pPr marL="0" indent="0">
-              <a:buNone/>
-            </a:pPr>
-            <a:endParaRPr lang="en-US" dirty="0"/>
           </a:p>
         </p:txBody>
       </p:sp>
@@ -4487,6 +4460,2023 @@
           </a:p>
         </p:txBody>
       </p:sp>
+      <mc:AlternateContent xmlns:mc="http://schemas.openxmlformats.org/markup-compatibility/2006">
+        <mc:Choice xmlns:a14="http://schemas.microsoft.com/office/drawing/2010/main" Requires="a14">
+          <p:sp>
+            <p:nvSpPr>
+              <p:cNvPr id="18" name="TextBox 17">
+                <a:extLst>
+                  <a:ext uri="{FF2B5EF4-FFF2-40B4-BE49-F238E27FC236}">
+                    <a16:creationId xmlns:a16="http://schemas.microsoft.com/office/drawing/2014/main" id="{5E7C57D4-D053-3FA2-D7A3-DA7A25B2B1F7}"/>
+                  </a:ext>
+                </a:extLst>
+              </p:cNvPr>
+              <p:cNvSpPr txBox="1"/>
+              <p:nvPr/>
+            </p:nvSpPr>
+            <p:spPr>
+              <a:xfrm>
+                <a:off x="872175" y="4561532"/>
+                <a:ext cx="1235210" cy="524567"/>
+              </a:xfrm>
+              <a:prstGeom prst="rect">
+                <a:avLst/>
+              </a:prstGeom>
+              <a:noFill/>
+            </p:spPr>
+            <p:txBody>
+              <a:bodyPr wrap="none" rtlCol="0">
+                <a:spAutoFit/>
+              </a:bodyPr>
+              <a:lstStyle/>
+              <a:p>
+                <a14:m>
+                  <m:oMathPara xmlns:m="http://schemas.openxmlformats.org/officeDocument/2006/math">
+                    <m:oMathParaPr>
+                      <m:jc m:val="centerGroup"/>
+                    </m:oMathParaPr>
+                    <m:oMath xmlns:m="http://schemas.openxmlformats.org/officeDocument/2006/math">
+                      <m:sSub>
+                        <m:sSubPr>
+                          <m:ctrlPr>
+                            <a:rPr lang="en-US" sz="1400" b="0" i="1" smtClean="0">
+                              <a:latin typeface="Cambria Math" panose="02040503050406030204" pitchFamily="18" charset="0"/>
+                            </a:rPr>
+                          </m:ctrlPr>
+                        </m:sSubPr>
+                        <m:e>
+                          <m:r>
+                            <a:rPr lang="en-US" sz="1400" b="0" i="1" smtClean="0">
+                              <a:latin typeface="Cambria Math" panose="02040503050406030204" pitchFamily="18" charset="0"/>
+                            </a:rPr>
+                            <m:t>𝛿</m:t>
+                          </m:r>
+                        </m:e>
+                        <m:sub>
+                          <m:r>
+                            <a:rPr lang="en-US" sz="1400" b="0" i="1" smtClean="0">
+                              <a:latin typeface="Cambria Math" panose="02040503050406030204" pitchFamily="18" charset="0"/>
+                            </a:rPr>
+                            <m:t>𝑚𝑎𝑥</m:t>
+                          </m:r>
+                        </m:sub>
+                      </m:sSub>
+                      <m:r>
+                        <a:rPr lang="en-US" sz="1400" b="0" i="1" smtClean="0">
+                          <a:latin typeface="Cambria Math" panose="02040503050406030204" pitchFamily="18" charset="0"/>
+                        </a:rPr>
+                        <m:t>=</m:t>
+                      </m:r>
+                      <m:f>
+                        <m:fPr>
+                          <m:ctrlPr>
+                            <a:rPr lang="en-US" sz="1400" b="0" i="1" smtClean="0">
+                              <a:latin typeface="Cambria Math" panose="02040503050406030204" pitchFamily="18" charset="0"/>
+                            </a:rPr>
+                          </m:ctrlPr>
+                        </m:fPr>
+                        <m:num>
+                          <m:r>
+                            <a:rPr lang="en-US" sz="1400" b="0" i="1" smtClean="0">
+                              <a:latin typeface="Cambria Math" panose="02040503050406030204" pitchFamily="18" charset="0"/>
+                            </a:rPr>
+                            <m:t>𝑃</m:t>
+                          </m:r>
+                          <m:sSup>
+                            <m:sSupPr>
+                              <m:ctrlPr>
+                                <a:rPr lang="en-US" sz="1400" b="0" i="1" smtClean="0">
+                                  <a:latin typeface="Cambria Math" panose="02040503050406030204" pitchFamily="18" charset="0"/>
+                                </a:rPr>
+                              </m:ctrlPr>
+                            </m:sSupPr>
+                            <m:e>
+                              <m:r>
+                                <a:rPr lang="en-US" sz="1400" b="0" i="1" smtClean="0">
+                                  <a:latin typeface="Cambria Math" panose="02040503050406030204" pitchFamily="18" charset="0"/>
+                                </a:rPr>
+                                <m:t>𝐿</m:t>
+                              </m:r>
+                            </m:e>
+                            <m:sup>
+                              <m:r>
+                                <a:rPr lang="en-US" sz="1400" b="0" i="1" smtClean="0">
+                                  <a:latin typeface="Cambria Math" panose="02040503050406030204" pitchFamily="18" charset="0"/>
+                                </a:rPr>
+                                <m:t>3</m:t>
+                              </m:r>
+                            </m:sup>
+                          </m:sSup>
+                        </m:num>
+                        <m:den>
+                          <m:r>
+                            <a:rPr lang="en-US" sz="1400" b="0" i="1" smtClean="0">
+                              <a:latin typeface="Cambria Math" panose="02040503050406030204" pitchFamily="18" charset="0"/>
+                            </a:rPr>
+                            <m:t>48</m:t>
+                          </m:r>
+                          <m:r>
+                            <a:rPr lang="en-US" sz="1400" b="0" i="1" smtClean="0">
+                              <a:latin typeface="Cambria Math" panose="02040503050406030204" pitchFamily="18" charset="0"/>
+                            </a:rPr>
+                            <m:t>𝐸𝐼</m:t>
+                          </m:r>
+                        </m:den>
+                      </m:f>
+                    </m:oMath>
+                  </m:oMathPara>
+                </a14:m>
+                <a:endParaRPr lang="en-US" sz="1400" dirty="0"/>
+              </a:p>
+            </p:txBody>
+          </p:sp>
+        </mc:Choice>
+        <mc:Fallback>
+          <p:sp>
+            <p:nvSpPr>
+              <p:cNvPr id="18" name="TextBox 17">
+                <a:extLst>
+                  <a:ext uri="{FF2B5EF4-FFF2-40B4-BE49-F238E27FC236}">
+                    <a16:creationId xmlns:a16="http://schemas.microsoft.com/office/drawing/2014/main" id="{5E7C57D4-D053-3FA2-D7A3-DA7A25B2B1F7}"/>
+                  </a:ext>
+                </a:extLst>
+              </p:cNvPr>
+              <p:cNvSpPr txBox="1">
+                <a:spLocks noRot="1" noChangeAspect="1" noMove="1" noResize="1" noEditPoints="1" noAdjustHandles="1" noChangeArrowheads="1" noChangeShapeType="1" noTextEdit="1"/>
+              </p:cNvSpPr>
+              <p:nvPr/>
+            </p:nvSpPr>
+            <p:spPr>
+              <a:xfrm>
+                <a:off x="872175" y="4561532"/>
+                <a:ext cx="1235210" cy="524567"/>
+              </a:xfrm>
+              <a:prstGeom prst="rect">
+                <a:avLst/>
+              </a:prstGeom>
+              <a:blipFill>
+                <a:blip r:embed="rId2"/>
+                <a:stretch>
+                  <a:fillRect/>
+                </a:stretch>
+              </a:blipFill>
+            </p:spPr>
+            <p:txBody>
+              <a:bodyPr/>
+              <a:lstStyle/>
+              <a:p>
+                <a:r>
+                  <a:rPr lang="en-US">
+                    <a:noFill/>
+                  </a:rPr>
+                  <a:t> </a:t>
+                </a:r>
+              </a:p>
+            </p:txBody>
+          </p:sp>
+        </mc:Fallback>
+      </mc:AlternateContent>
+      <mc:AlternateContent xmlns:mc="http://schemas.openxmlformats.org/markup-compatibility/2006">
+        <mc:Choice xmlns:a14="http://schemas.microsoft.com/office/drawing/2010/main" Requires="a14">
+          <p:sp>
+            <p:nvSpPr>
+              <p:cNvPr id="19" name="TextBox 18">
+                <a:extLst>
+                  <a:ext uri="{FF2B5EF4-FFF2-40B4-BE49-F238E27FC236}">
+                    <a16:creationId xmlns:a16="http://schemas.microsoft.com/office/drawing/2014/main" id="{7389D2F6-3E17-DE2E-7F1C-4EFF1886F0F5}"/>
+                  </a:ext>
+                </a:extLst>
+              </p:cNvPr>
+              <p:cNvSpPr txBox="1"/>
+              <p:nvPr/>
+            </p:nvSpPr>
+            <p:spPr>
+              <a:xfrm>
+                <a:off x="738700" y="1490964"/>
+                <a:ext cx="4199060" cy="307777"/>
+              </a:xfrm>
+              <a:prstGeom prst="rect">
+                <a:avLst/>
+              </a:prstGeom>
+              <a:noFill/>
+            </p:spPr>
+            <p:txBody>
+              <a:bodyPr wrap="square" rtlCol="0">
+                <a:spAutoFit/>
+              </a:bodyPr>
+              <a:lstStyle/>
+              <a:p>
+                <a:r>
+                  <a:rPr lang="en-US" sz="1400" u="sng" dirty="0">
+                    <a:latin typeface="+mj-lt"/>
+                  </a:rPr>
+                  <a:t>Direct Problem</a:t>
+                </a:r>
+                <a:r>
+                  <a:rPr lang="en-US" sz="1400" dirty="0">
+                    <a:latin typeface="+mj-lt"/>
+                  </a:rPr>
+                  <a:t>: Given P = 1kip </a:t>
+                </a:r>
+                <a14:m>
+                  <m:oMath xmlns:m="http://schemas.openxmlformats.org/officeDocument/2006/math">
+                    <m:r>
+                      <a:rPr lang="en-US" sz="1400" b="0" i="1" smtClean="0">
+                        <a:latin typeface="Cambria Math" panose="02040503050406030204" pitchFamily="18" charset="0"/>
+                      </a:rPr>
+                      <m:t>→</m:t>
+                    </m:r>
+                  </m:oMath>
+                </a14:m>
+                <a:r>
+                  <a:rPr lang="en-US" sz="1400" dirty="0">
+                    <a:latin typeface="+mj-lt"/>
+                  </a:rPr>
+                  <a:t> find </a:t>
+                </a:r>
+                <a14:m>
+                  <m:oMath xmlns:m="http://schemas.openxmlformats.org/officeDocument/2006/math">
+                    <m:sSub>
+                      <m:sSubPr>
+                        <m:ctrlPr>
+                          <a:rPr lang="en-US" sz="1400" b="0" i="1" smtClean="0">
+                            <a:latin typeface="Cambria Math" panose="02040503050406030204" pitchFamily="18" charset="0"/>
+                          </a:rPr>
+                        </m:ctrlPr>
+                      </m:sSubPr>
+                      <m:e>
+                        <m:r>
+                          <a:rPr lang="en-US" sz="1400" b="0" i="1" smtClean="0">
+                            <a:latin typeface="Cambria Math" panose="02040503050406030204" pitchFamily="18" charset="0"/>
+                          </a:rPr>
+                          <m:t>𝛿</m:t>
+                        </m:r>
+                      </m:e>
+                      <m:sub>
+                        <m:r>
+                          <a:rPr lang="en-US" sz="1400" b="0" i="1" smtClean="0">
+                            <a:latin typeface="Cambria Math" panose="02040503050406030204" pitchFamily="18" charset="0"/>
+                          </a:rPr>
+                          <m:t>𝑚𝑎𝑥</m:t>
+                        </m:r>
+                      </m:sub>
+                    </m:sSub>
+                  </m:oMath>
+                </a14:m>
+                <a:endParaRPr lang="en-US" sz="1400" dirty="0"/>
+              </a:p>
+            </p:txBody>
+          </p:sp>
+        </mc:Choice>
+        <mc:Fallback>
+          <p:sp>
+            <p:nvSpPr>
+              <p:cNvPr id="19" name="TextBox 18">
+                <a:extLst>
+                  <a:ext uri="{FF2B5EF4-FFF2-40B4-BE49-F238E27FC236}">
+                    <a16:creationId xmlns:a16="http://schemas.microsoft.com/office/drawing/2014/main" id="{7389D2F6-3E17-DE2E-7F1C-4EFF1886F0F5}"/>
+                  </a:ext>
+                </a:extLst>
+              </p:cNvPr>
+              <p:cNvSpPr txBox="1">
+                <a:spLocks noRot="1" noChangeAspect="1" noMove="1" noResize="1" noEditPoints="1" noAdjustHandles="1" noChangeArrowheads="1" noChangeShapeType="1" noTextEdit="1"/>
+              </p:cNvSpPr>
+              <p:nvPr/>
+            </p:nvSpPr>
+            <p:spPr>
+              <a:xfrm>
+                <a:off x="738700" y="1490964"/>
+                <a:ext cx="4199060" cy="307777"/>
+              </a:xfrm>
+              <a:prstGeom prst="rect">
+                <a:avLst/>
+              </a:prstGeom>
+              <a:blipFill>
+                <a:blip r:embed="rId3"/>
+                <a:stretch>
+                  <a:fillRect l="-435" t="-4000" b="-20000"/>
+                </a:stretch>
+              </a:blipFill>
+            </p:spPr>
+            <p:txBody>
+              <a:bodyPr/>
+              <a:lstStyle/>
+              <a:p>
+                <a:r>
+                  <a:rPr lang="en-US">
+                    <a:noFill/>
+                  </a:rPr>
+                  <a:t> </a:t>
+                </a:r>
+              </a:p>
+            </p:txBody>
+          </p:sp>
+        </mc:Fallback>
+      </mc:AlternateContent>
+      <p:grpSp>
+        <p:nvGrpSpPr>
+          <p:cNvPr id="62" name="Group 61">
+            <a:extLst>
+              <a:ext uri="{FF2B5EF4-FFF2-40B4-BE49-F238E27FC236}">
+                <a16:creationId xmlns:a16="http://schemas.microsoft.com/office/drawing/2014/main" id="{AE732E19-D314-573C-02C7-3C7F65A631BC}"/>
+              </a:ext>
+            </a:extLst>
+          </p:cNvPr>
+          <p:cNvGrpSpPr/>
+          <p:nvPr/>
+        </p:nvGrpSpPr>
+        <p:grpSpPr>
+          <a:xfrm>
+            <a:off x="838200" y="1995445"/>
+            <a:ext cx="4228832" cy="2274428"/>
+            <a:chOff x="1251331" y="1981432"/>
+            <a:chExt cx="3272155" cy="1939433"/>
+          </a:xfrm>
+        </p:grpSpPr>
+        <p:cxnSp>
+          <p:nvCxnSpPr>
+            <p:cNvPr id="6" name="Straight Connector 5">
+              <a:extLst>
+                <a:ext uri="{FF2B5EF4-FFF2-40B4-BE49-F238E27FC236}">
+                  <a16:creationId xmlns:a16="http://schemas.microsoft.com/office/drawing/2014/main" id="{6E8325AE-DED3-E213-B98C-9A4E3E480D92}"/>
+                </a:ext>
+              </a:extLst>
+            </p:cNvPr>
+            <p:cNvCxnSpPr>
+              <a:cxnSpLocks/>
+            </p:cNvCxnSpPr>
+            <p:nvPr/>
+          </p:nvCxnSpPr>
+          <p:spPr>
+            <a:xfrm>
+              <a:off x="1251331" y="3148491"/>
+              <a:ext cx="3272155" cy="0"/>
+            </a:xfrm>
+            <a:prstGeom prst="line">
+              <a:avLst/>
+            </a:prstGeom>
+            <a:ln w="57150"/>
+          </p:spPr>
+          <p:style>
+            <a:lnRef idx="2">
+              <a:schemeClr val="dk1"/>
+            </a:lnRef>
+            <a:fillRef idx="0">
+              <a:schemeClr val="dk1"/>
+            </a:fillRef>
+            <a:effectRef idx="1">
+              <a:schemeClr val="dk1"/>
+            </a:effectRef>
+            <a:fontRef idx="minor">
+              <a:schemeClr val="tx1"/>
+            </a:fontRef>
+          </p:style>
+        </p:cxnSp>
+        <p:sp>
+          <p:nvSpPr>
+            <p:cNvPr id="9" name="Oval 8">
+              <a:extLst>
+                <a:ext uri="{FF2B5EF4-FFF2-40B4-BE49-F238E27FC236}">
+                  <a16:creationId xmlns:a16="http://schemas.microsoft.com/office/drawing/2014/main" id="{31EBE27E-CAE8-08A3-2C4D-2A46B6C62D77}"/>
+                </a:ext>
+              </a:extLst>
+            </p:cNvPr>
+            <p:cNvSpPr/>
+            <p:nvPr/>
+          </p:nvSpPr>
+          <p:spPr>
+            <a:xfrm>
+              <a:off x="4189805" y="3148491"/>
+              <a:ext cx="268785" cy="287394"/>
+            </a:xfrm>
+            <a:prstGeom prst="ellipse">
+              <a:avLst/>
+            </a:prstGeom>
+            <a:solidFill>
+              <a:schemeClr val="dk1"/>
+            </a:solidFill>
+            <a:ln>
+              <a:noFill/>
+            </a:ln>
+          </p:spPr>
+          <p:style>
+            <a:lnRef idx="0">
+              <a:scrgbClr r="0" g="0" b="0"/>
+            </a:lnRef>
+            <a:fillRef idx="0">
+              <a:scrgbClr r="0" g="0" b="0"/>
+            </a:fillRef>
+            <a:effectRef idx="0">
+              <a:scrgbClr r="0" g="0" b="0"/>
+            </a:effectRef>
+            <a:fontRef idx="minor">
+              <a:schemeClr val="lt1"/>
+            </a:fontRef>
+          </p:style>
+          <p:txBody>
+            <a:bodyPr rtlCol="0" anchor="ctr"/>
+            <a:lstStyle/>
+            <a:p>
+              <a:pPr algn="ctr"/>
+              <a:endParaRPr lang="en-US" dirty="0"/>
+            </a:p>
+          </p:txBody>
+        </p:sp>
+        <p:sp>
+          <p:nvSpPr>
+            <p:cNvPr id="10" name="Isosceles Triangle 9">
+              <a:extLst>
+                <a:ext uri="{FF2B5EF4-FFF2-40B4-BE49-F238E27FC236}">
+                  <a16:creationId xmlns:a16="http://schemas.microsoft.com/office/drawing/2014/main" id="{931989D5-2FAF-31AE-6ACF-0279BEDE4A17}"/>
+                </a:ext>
+              </a:extLst>
+            </p:cNvPr>
+            <p:cNvSpPr/>
+            <p:nvPr/>
+          </p:nvSpPr>
+          <p:spPr>
+            <a:xfrm>
+              <a:off x="1277620" y="3148491"/>
+              <a:ext cx="246888" cy="261741"/>
+            </a:xfrm>
+            <a:prstGeom prst="triangle">
+              <a:avLst/>
+            </a:prstGeom>
+            <a:solidFill>
+              <a:schemeClr val="dk1"/>
+            </a:solidFill>
+            <a:ln>
+              <a:noFill/>
+            </a:ln>
+          </p:spPr>
+          <p:style>
+            <a:lnRef idx="0">
+              <a:scrgbClr r="0" g="0" b="0"/>
+            </a:lnRef>
+            <a:fillRef idx="0">
+              <a:scrgbClr r="0" g="0" b="0"/>
+            </a:fillRef>
+            <a:effectRef idx="0">
+              <a:scrgbClr r="0" g="0" b="0"/>
+            </a:effectRef>
+            <a:fontRef idx="minor">
+              <a:schemeClr val="lt1"/>
+            </a:fontRef>
+          </p:style>
+          <p:txBody>
+            <a:bodyPr rtlCol="0" anchor="ctr"/>
+            <a:lstStyle/>
+            <a:p>
+              <a:pPr algn="ctr"/>
+              <a:endParaRPr lang="en-US"/>
+            </a:p>
+          </p:txBody>
+        </p:sp>
+        <p:cxnSp>
+          <p:nvCxnSpPr>
+            <p:cNvPr id="13" name="Straight Arrow Connector 12">
+              <a:extLst>
+                <a:ext uri="{FF2B5EF4-FFF2-40B4-BE49-F238E27FC236}">
+                  <a16:creationId xmlns:a16="http://schemas.microsoft.com/office/drawing/2014/main" id="{10F14CBA-F8AE-662F-CF4E-1B6D17206F2C}"/>
+                </a:ext>
+              </a:extLst>
+            </p:cNvPr>
+            <p:cNvCxnSpPr/>
+            <p:nvPr/>
+          </p:nvCxnSpPr>
+          <p:spPr>
+            <a:xfrm>
+              <a:off x="2797315" y="2188370"/>
+              <a:ext cx="0" cy="960120"/>
+            </a:xfrm>
+            <a:prstGeom prst="straightConnector1">
+              <a:avLst/>
+            </a:prstGeom>
+            <a:ln w="38100">
+              <a:tailEnd type="triangle"/>
+            </a:ln>
+          </p:spPr>
+          <p:style>
+            <a:lnRef idx="1">
+              <a:schemeClr val="dk1"/>
+            </a:lnRef>
+            <a:fillRef idx="0">
+              <a:schemeClr val="dk1"/>
+            </a:fillRef>
+            <a:effectRef idx="0">
+              <a:schemeClr val="dk1"/>
+            </a:effectRef>
+            <a:fontRef idx="minor">
+              <a:schemeClr val="tx1"/>
+            </a:fontRef>
+          </p:style>
+        </p:cxnSp>
+        <p:cxnSp>
+          <p:nvCxnSpPr>
+            <p:cNvPr id="15" name="Straight Connector 14">
+              <a:extLst>
+                <a:ext uri="{FF2B5EF4-FFF2-40B4-BE49-F238E27FC236}">
+                  <a16:creationId xmlns:a16="http://schemas.microsoft.com/office/drawing/2014/main" id="{2DD661CD-0A86-1F05-8243-BFCE8068CF65}"/>
+                </a:ext>
+              </a:extLst>
+            </p:cNvPr>
+            <p:cNvCxnSpPr>
+              <a:cxnSpLocks/>
+            </p:cNvCxnSpPr>
+            <p:nvPr/>
+          </p:nvCxnSpPr>
+          <p:spPr>
+            <a:xfrm>
+              <a:off x="1392891" y="3664365"/>
+              <a:ext cx="2907792" cy="0"/>
+            </a:xfrm>
+            <a:prstGeom prst="line">
+              <a:avLst/>
+            </a:prstGeom>
+          </p:spPr>
+          <p:style>
+            <a:lnRef idx="2">
+              <a:schemeClr val="dk1"/>
+            </a:lnRef>
+            <a:fillRef idx="0">
+              <a:schemeClr val="dk1"/>
+            </a:fillRef>
+            <a:effectRef idx="1">
+              <a:schemeClr val="dk1"/>
+            </a:effectRef>
+            <a:fontRef idx="minor">
+              <a:schemeClr val="tx1"/>
+            </a:fontRef>
+          </p:style>
+        </p:cxnSp>
+        <p:sp>
+          <p:nvSpPr>
+            <p:cNvPr id="16" name="TextBox 15">
+              <a:extLst>
+                <a:ext uri="{FF2B5EF4-FFF2-40B4-BE49-F238E27FC236}">
+                  <a16:creationId xmlns:a16="http://schemas.microsoft.com/office/drawing/2014/main" id="{42544661-510E-BE9A-2811-6ABFFA9A2BEE}"/>
+                </a:ext>
+              </a:extLst>
+            </p:cNvPr>
+            <p:cNvSpPr txBox="1"/>
+            <p:nvPr/>
+          </p:nvSpPr>
+          <p:spPr>
+            <a:xfrm>
+              <a:off x="2692874" y="3684664"/>
+              <a:ext cx="530428" cy="236201"/>
+            </a:xfrm>
+            <a:prstGeom prst="rect">
+              <a:avLst/>
+            </a:prstGeom>
+            <a:noFill/>
+          </p:spPr>
+          <p:txBody>
+            <a:bodyPr wrap="none" rtlCol="0">
+              <a:spAutoFit/>
+            </a:bodyPr>
+            <a:lstStyle/>
+            <a:p>
+              <a:r>
+                <a:rPr lang="en-US" sz="1200" dirty="0">
+                  <a:latin typeface="+mj-lt"/>
+                </a:rPr>
+                <a:t>L = 10ft</a:t>
+              </a:r>
+            </a:p>
+          </p:txBody>
+        </p:sp>
+        <p:sp>
+          <p:nvSpPr>
+            <p:cNvPr id="17" name="TextBox 16">
+              <a:extLst>
+                <a:ext uri="{FF2B5EF4-FFF2-40B4-BE49-F238E27FC236}">
+                  <a16:creationId xmlns:a16="http://schemas.microsoft.com/office/drawing/2014/main" id="{9EDFEEE9-4719-B4E5-1D66-29738176C074}"/>
+                </a:ext>
+              </a:extLst>
+            </p:cNvPr>
+            <p:cNvSpPr txBox="1"/>
+            <p:nvPr/>
+          </p:nvSpPr>
+          <p:spPr>
+            <a:xfrm>
+              <a:off x="2591957" y="1981432"/>
+              <a:ext cx="701539" cy="276999"/>
+            </a:xfrm>
+            <a:prstGeom prst="rect">
+              <a:avLst/>
+            </a:prstGeom>
+            <a:noFill/>
+          </p:spPr>
+          <p:txBody>
+            <a:bodyPr wrap="none" rtlCol="0">
+              <a:spAutoFit/>
+            </a:bodyPr>
+            <a:lstStyle/>
+            <a:p>
+              <a:r>
+                <a:rPr lang="en-US" sz="1200" dirty="0">
+                  <a:latin typeface="+mj-lt"/>
+                </a:rPr>
+                <a:t>P = 1kip</a:t>
+              </a:r>
+            </a:p>
+          </p:txBody>
+        </p:sp>
+        <p:sp>
+          <p:nvSpPr>
+            <p:cNvPr id="21" name="Freeform: Shape 20">
+              <a:extLst>
+                <a:ext uri="{FF2B5EF4-FFF2-40B4-BE49-F238E27FC236}">
+                  <a16:creationId xmlns:a16="http://schemas.microsoft.com/office/drawing/2014/main" id="{426F3BCA-CD29-8435-C781-AD20DA9B3B44}"/>
+                </a:ext>
+              </a:extLst>
+            </p:cNvPr>
+            <p:cNvSpPr/>
+            <p:nvPr/>
+          </p:nvSpPr>
+          <p:spPr>
+            <a:xfrm>
+              <a:off x="1435608" y="3168789"/>
+              <a:ext cx="2812415" cy="397404"/>
+            </a:xfrm>
+            <a:custGeom>
+              <a:avLst/>
+              <a:gdLst>
+                <a:gd name="csX0" fmla="*/ 0 w 2889504"/>
+                <a:gd name="csY0" fmla="*/ 18288 h 420657"/>
+                <a:gd name="csX1" fmla="*/ 1399032 w 2889504"/>
+                <a:gd name="csY1" fmla="*/ 420624 h 420657"/>
+                <a:gd name="csX2" fmla="*/ 2889504 w 2889504"/>
+                <a:gd name="csY2" fmla="*/ 0 h 420657"/>
+              </a:gdLst>
+              <a:ahLst/>
+              <a:cxnLst>
+                <a:cxn ang="0">
+                  <a:pos x="csX0" y="csY0"/>
+                </a:cxn>
+                <a:cxn ang="0">
+                  <a:pos x="csX1" y="csY1"/>
+                </a:cxn>
+                <a:cxn ang="0">
+                  <a:pos x="csX2" y="csY2"/>
+                </a:cxn>
+              </a:cxnLst>
+              <a:rect l="l" t="t" r="r" b="b"/>
+              <a:pathLst>
+                <a:path w="2889504" h="420657">
+                  <a:moveTo>
+                    <a:pt x="0" y="18288"/>
+                  </a:moveTo>
+                  <a:cubicBezTo>
+                    <a:pt x="458724" y="220980"/>
+                    <a:pt x="917448" y="423672"/>
+                    <a:pt x="1399032" y="420624"/>
+                  </a:cubicBezTo>
+                  <a:cubicBezTo>
+                    <a:pt x="1880616" y="417576"/>
+                    <a:pt x="2631948" y="92964"/>
+                    <a:pt x="2889504" y="0"/>
+                  </a:cubicBezTo>
+                </a:path>
+              </a:pathLst>
+            </a:custGeom>
+            <a:ln w="28575">
+              <a:solidFill>
+                <a:schemeClr val="tx2">
+                  <a:lumMod val="50000"/>
+                  <a:lumOff val="50000"/>
+                </a:schemeClr>
+              </a:solidFill>
+              <a:prstDash val="sysDash"/>
+            </a:ln>
+          </p:spPr>
+          <p:style>
+            <a:lnRef idx="1">
+              <a:schemeClr val="accent4"/>
+            </a:lnRef>
+            <a:fillRef idx="0">
+              <a:schemeClr val="accent4"/>
+            </a:fillRef>
+            <a:effectRef idx="0">
+              <a:schemeClr val="accent4"/>
+            </a:effectRef>
+            <a:fontRef idx="minor">
+              <a:schemeClr val="tx1"/>
+            </a:fontRef>
+          </p:style>
+          <p:txBody>
+            <a:bodyPr rtlCol="0" anchor="ctr"/>
+            <a:lstStyle/>
+            <a:p>
+              <a:pPr algn="ctr"/>
+              <a:endParaRPr lang="en-US"/>
+            </a:p>
+          </p:txBody>
+        </p:sp>
+        <mc:AlternateContent xmlns:mc="http://schemas.openxmlformats.org/markup-compatibility/2006">
+          <mc:Choice xmlns:a14="http://schemas.microsoft.com/office/drawing/2010/main" Requires="a14">
+            <p:sp>
+              <p:nvSpPr>
+                <p:cNvPr id="22" name="TextBox 21">
+                  <a:extLst>
+                    <a:ext uri="{FF2B5EF4-FFF2-40B4-BE49-F238E27FC236}">
+                      <a16:creationId xmlns:a16="http://schemas.microsoft.com/office/drawing/2014/main" id="{2BF41112-A617-D58F-2843-A66808D45CAA}"/>
+                    </a:ext>
+                  </a:extLst>
+                </p:cNvPr>
+                <p:cNvSpPr txBox="1"/>
+                <p:nvPr/>
+              </p:nvSpPr>
+              <p:spPr>
+                <a:xfrm>
+                  <a:off x="2709843" y="3216928"/>
+                  <a:ext cx="759952" cy="276999"/>
+                </a:xfrm>
+                <a:prstGeom prst="rect">
+                  <a:avLst/>
+                </a:prstGeom>
+                <a:noFill/>
+              </p:spPr>
+              <p:txBody>
+                <a:bodyPr wrap="none" rtlCol="0">
+                  <a:spAutoFit/>
+                </a:bodyPr>
+                <a:lstStyle/>
+                <a:p>
+                  <a14:m>
+                    <m:oMathPara xmlns:m="http://schemas.openxmlformats.org/officeDocument/2006/math">
+                      <m:oMathParaPr>
+                        <m:jc m:val="centerGroup"/>
+                      </m:oMathParaPr>
+                      <m:oMath xmlns:m="http://schemas.openxmlformats.org/officeDocument/2006/math">
+                        <m:sSub>
+                          <m:sSubPr>
+                            <m:ctrlPr>
+                              <a:rPr lang="en-US" sz="1200" b="0" i="0" smtClean="0">
+                                <a:solidFill>
+                                  <a:schemeClr val="tx2">
+                                    <a:lumMod val="50000"/>
+                                    <a:lumOff val="50000"/>
+                                  </a:schemeClr>
+                                </a:solidFill>
+                                <a:latin typeface="Cambria Math" panose="02040503050406030204" pitchFamily="18" charset="0"/>
+                              </a:rPr>
+                            </m:ctrlPr>
+                          </m:sSubPr>
+                          <m:e>
+                            <m:r>
+                              <a:rPr lang="en-US" sz="1200" b="0" i="1" smtClean="0">
+                                <a:solidFill>
+                                  <a:schemeClr val="tx2">
+                                    <a:lumMod val="50000"/>
+                                    <a:lumOff val="50000"/>
+                                  </a:schemeClr>
+                                </a:solidFill>
+                                <a:latin typeface="Cambria Math" panose="02040503050406030204" pitchFamily="18" charset="0"/>
+                              </a:rPr>
+                              <m:t>𝛿</m:t>
+                            </m:r>
+                          </m:e>
+                          <m:sub>
+                            <m:r>
+                              <m:rPr>
+                                <m:sty m:val="p"/>
+                              </m:rPr>
+                              <a:rPr lang="en-US" sz="1200" b="0" i="0" smtClean="0">
+                                <a:solidFill>
+                                  <a:schemeClr val="tx2">
+                                    <a:lumMod val="50000"/>
+                                    <a:lumOff val="50000"/>
+                                  </a:schemeClr>
+                                </a:solidFill>
+                                <a:latin typeface="Cambria Math" panose="02040503050406030204" pitchFamily="18" charset="0"/>
+                              </a:rPr>
+                              <m:t>max</m:t>
+                            </m:r>
+                          </m:sub>
+                        </m:sSub>
+                        <m:r>
+                          <a:rPr lang="en-US" sz="1200" b="0" i="0" smtClean="0">
+                            <a:solidFill>
+                              <a:schemeClr val="tx2">
+                                <a:lumMod val="50000"/>
+                                <a:lumOff val="50000"/>
+                              </a:schemeClr>
+                            </a:solidFill>
+                            <a:latin typeface="Cambria Math" panose="02040503050406030204" pitchFamily="18" charset="0"/>
+                          </a:rPr>
+                          <m:t>=?</m:t>
+                        </m:r>
+                      </m:oMath>
+                    </m:oMathPara>
+                  </a14:m>
+                  <a:endParaRPr lang="en-US" sz="1200" dirty="0">
+                    <a:solidFill>
+                      <a:schemeClr val="tx2">
+                        <a:lumMod val="50000"/>
+                        <a:lumOff val="50000"/>
+                      </a:schemeClr>
+                    </a:solidFill>
+                    <a:latin typeface="+mj-lt"/>
+                  </a:endParaRPr>
+                </a:p>
+              </p:txBody>
+            </p:sp>
+          </mc:Choice>
+          <mc:Fallback>
+            <p:sp>
+              <p:nvSpPr>
+                <p:cNvPr id="22" name="TextBox 21">
+                  <a:extLst>
+                    <a:ext uri="{FF2B5EF4-FFF2-40B4-BE49-F238E27FC236}">
+                      <a16:creationId xmlns:a16="http://schemas.microsoft.com/office/drawing/2014/main" id="{2BF41112-A617-D58F-2843-A66808D45CAA}"/>
+                    </a:ext>
+                  </a:extLst>
+                </p:cNvPr>
+                <p:cNvSpPr txBox="1">
+                  <a:spLocks noRot="1" noChangeAspect="1" noMove="1" noResize="1" noEditPoints="1" noAdjustHandles="1" noChangeArrowheads="1" noChangeShapeType="1" noTextEdit="1"/>
+                </p:cNvSpPr>
+                <p:nvPr/>
+              </p:nvSpPr>
+              <p:spPr>
+                <a:xfrm>
+                  <a:off x="2709843" y="3216928"/>
+                  <a:ext cx="759952" cy="276999"/>
+                </a:xfrm>
+                <a:prstGeom prst="rect">
+                  <a:avLst/>
+                </a:prstGeom>
+                <a:blipFill>
+                  <a:blip r:embed="rId4"/>
+                  <a:stretch>
+                    <a:fillRect/>
+                  </a:stretch>
+                </a:blipFill>
+              </p:spPr>
+              <p:txBody>
+                <a:bodyPr/>
+                <a:lstStyle/>
+                <a:p>
+                  <a:r>
+                    <a:rPr lang="en-US">
+                      <a:noFill/>
+                    </a:rPr>
+                    <a:t> </a:t>
+                  </a:r>
+                </a:p>
+              </p:txBody>
+            </p:sp>
+          </mc:Fallback>
+        </mc:AlternateContent>
+        <p:cxnSp>
+          <p:nvCxnSpPr>
+            <p:cNvPr id="24" name="Straight Connector 23">
+              <a:extLst>
+                <a:ext uri="{FF2B5EF4-FFF2-40B4-BE49-F238E27FC236}">
+                  <a16:creationId xmlns:a16="http://schemas.microsoft.com/office/drawing/2014/main" id="{5AA1EA16-884C-B146-42BE-6001089CF373}"/>
+                </a:ext>
+              </a:extLst>
+            </p:cNvPr>
+            <p:cNvCxnSpPr/>
+            <p:nvPr/>
+          </p:nvCxnSpPr>
+          <p:spPr>
+            <a:xfrm>
+              <a:off x="1393653" y="3560626"/>
+              <a:ext cx="0" cy="207478"/>
+            </a:xfrm>
+            <a:prstGeom prst="line">
+              <a:avLst/>
+            </a:prstGeom>
+          </p:spPr>
+          <p:style>
+            <a:lnRef idx="2">
+              <a:schemeClr val="dk1"/>
+            </a:lnRef>
+            <a:fillRef idx="0">
+              <a:schemeClr val="dk1"/>
+            </a:fillRef>
+            <a:effectRef idx="1">
+              <a:schemeClr val="dk1"/>
+            </a:effectRef>
+            <a:fontRef idx="minor">
+              <a:schemeClr val="tx1"/>
+            </a:fontRef>
+          </p:style>
+        </p:cxnSp>
+        <p:cxnSp>
+          <p:nvCxnSpPr>
+            <p:cNvPr id="25" name="Straight Connector 24">
+              <a:extLst>
+                <a:ext uri="{FF2B5EF4-FFF2-40B4-BE49-F238E27FC236}">
+                  <a16:creationId xmlns:a16="http://schemas.microsoft.com/office/drawing/2014/main" id="{061C749F-15B5-98BF-0DA7-19827849CD80}"/>
+                </a:ext>
+              </a:extLst>
+            </p:cNvPr>
+            <p:cNvCxnSpPr/>
+            <p:nvPr/>
+          </p:nvCxnSpPr>
+          <p:spPr>
+            <a:xfrm>
+              <a:off x="4300683" y="3560626"/>
+              <a:ext cx="0" cy="207478"/>
+            </a:xfrm>
+            <a:prstGeom prst="line">
+              <a:avLst/>
+            </a:prstGeom>
+          </p:spPr>
+          <p:style>
+            <a:lnRef idx="2">
+              <a:schemeClr val="dk1"/>
+            </a:lnRef>
+            <a:fillRef idx="0">
+              <a:schemeClr val="dk1"/>
+            </a:fillRef>
+            <a:effectRef idx="1">
+              <a:schemeClr val="dk1"/>
+            </a:effectRef>
+            <a:fontRef idx="minor">
+              <a:schemeClr val="tx1"/>
+            </a:fontRef>
+          </p:style>
+        </p:cxnSp>
+        <p:cxnSp>
+          <p:nvCxnSpPr>
+            <p:cNvPr id="29" name="Straight Connector 28">
+              <a:extLst>
+                <a:ext uri="{FF2B5EF4-FFF2-40B4-BE49-F238E27FC236}">
+                  <a16:creationId xmlns:a16="http://schemas.microsoft.com/office/drawing/2014/main" id="{0D8CBFD8-4CE9-7E51-33C1-DCEA86FD3D3F}"/>
+                </a:ext>
+              </a:extLst>
+            </p:cNvPr>
+            <p:cNvCxnSpPr>
+              <a:cxnSpLocks/>
+              <a:endCxn id="21" idx="1"/>
+            </p:cNvCxnSpPr>
+            <p:nvPr/>
+          </p:nvCxnSpPr>
+          <p:spPr>
+            <a:xfrm>
+              <a:off x="2797315" y="3168789"/>
+              <a:ext cx="0" cy="397373"/>
+            </a:xfrm>
+            <a:prstGeom prst="line">
+              <a:avLst/>
+            </a:prstGeom>
+            <a:ln w="9525">
+              <a:solidFill>
+                <a:schemeClr val="tx2">
+                  <a:lumMod val="50000"/>
+                  <a:lumOff val="50000"/>
+                </a:schemeClr>
+              </a:solidFill>
+              <a:prstDash val="dash"/>
+            </a:ln>
+          </p:spPr>
+          <p:style>
+            <a:lnRef idx="2">
+              <a:schemeClr val="accent4"/>
+            </a:lnRef>
+            <a:fillRef idx="0">
+              <a:schemeClr val="accent4"/>
+            </a:fillRef>
+            <a:effectRef idx="1">
+              <a:schemeClr val="accent4"/>
+            </a:effectRef>
+            <a:fontRef idx="minor">
+              <a:schemeClr val="tx1"/>
+            </a:fontRef>
+          </p:style>
+        </p:cxnSp>
+      </p:grpSp>
+      <mc:AlternateContent xmlns:mc="http://schemas.openxmlformats.org/markup-compatibility/2006">
+        <mc:Choice xmlns:a14="http://schemas.microsoft.com/office/drawing/2010/main" Requires="a14">
+          <p:sp>
+            <p:nvSpPr>
+              <p:cNvPr id="56" name="TextBox 55">
+                <a:extLst>
+                  <a:ext uri="{FF2B5EF4-FFF2-40B4-BE49-F238E27FC236}">
+                    <a16:creationId xmlns:a16="http://schemas.microsoft.com/office/drawing/2014/main" id="{572E8742-149B-EF35-A281-96D220FBCDD6}"/>
+                  </a:ext>
+                </a:extLst>
+              </p:cNvPr>
+              <p:cNvSpPr txBox="1"/>
+              <p:nvPr/>
+            </p:nvSpPr>
+            <p:spPr>
+              <a:xfrm>
+                <a:off x="6575371" y="1490963"/>
+                <a:ext cx="4959401" cy="307777"/>
+              </a:xfrm>
+              <a:prstGeom prst="rect">
+                <a:avLst/>
+              </a:prstGeom>
+              <a:noFill/>
+            </p:spPr>
+            <p:txBody>
+              <a:bodyPr wrap="square" rtlCol="0">
+                <a:spAutoFit/>
+              </a:bodyPr>
+              <a:lstStyle/>
+              <a:p>
+                <a:r>
+                  <a:rPr lang="en-US" sz="1400" u="sng" dirty="0">
+                    <a:latin typeface="+mj-lt"/>
+                  </a:rPr>
+                  <a:t>Inverse Problem</a:t>
+                </a:r>
+                <a:r>
+                  <a:rPr lang="en-US" sz="1400" dirty="0">
+                    <a:latin typeface="+mj-lt"/>
+                  </a:rPr>
+                  <a:t>: Given </a:t>
+                </a:r>
+                <a14:m>
+                  <m:oMath xmlns:m="http://schemas.openxmlformats.org/officeDocument/2006/math">
+                    <m:sSub>
+                      <m:sSubPr>
+                        <m:ctrlPr>
+                          <a:rPr lang="en-US" sz="1400" b="0" i="1" smtClean="0">
+                            <a:latin typeface="Cambria Math" panose="02040503050406030204" pitchFamily="18" charset="0"/>
+                          </a:rPr>
+                        </m:ctrlPr>
+                      </m:sSubPr>
+                      <m:e>
+                        <m:r>
+                          <a:rPr lang="en-US" sz="1400" b="0" i="1" smtClean="0">
+                            <a:latin typeface="Cambria Math" panose="02040503050406030204" pitchFamily="18" charset="0"/>
+                          </a:rPr>
+                          <m:t>𝛿</m:t>
+                        </m:r>
+                      </m:e>
+                      <m:sub>
+                        <m:r>
+                          <a:rPr lang="en-US" sz="1400" b="0" i="1" smtClean="0">
+                            <a:latin typeface="Cambria Math" panose="02040503050406030204" pitchFamily="18" charset="0"/>
+                          </a:rPr>
+                          <m:t>𝑚𝑎𝑥</m:t>
+                        </m:r>
+                      </m:sub>
+                    </m:sSub>
+                  </m:oMath>
+                </a14:m>
+                <a:r>
+                  <a:rPr lang="en-US" sz="1400" dirty="0">
+                    <a:latin typeface="+mj-lt"/>
+                  </a:rPr>
+                  <a:t> = 1in </a:t>
+                </a:r>
+                <a14:m>
+                  <m:oMath xmlns:m="http://schemas.openxmlformats.org/officeDocument/2006/math">
+                    <m:r>
+                      <a:rPr lang="en-US" sz="1400" b="0" i="1" smtClean="0">
+                        <a:latin typeface="Cambria Math" panose="02040503050406030204" pitchFamily="18" charset="0"/>
+                      </a:rPr>
+                      <m:t>→</m:t>
+                    </m:r>
+                  </m:oMath>
+                </a14:m>
+                <a:r>
+                  <a:rPr lang="en-US" sz="1400" dirty="0">
+                    <a:latin typeface="+mj-lt"/>
+                  </a:rPr>
+                  <a:t> find P</a:t>
+                </a:r>
+              </a:p>
+            </p:txBody>
+          </p:sp>
+        </mc:Choice>
+        <mc:Fallback>
+          <p:sp>
+            <p:nvSpPr>
+              <p:cNvPr id="56" name="TextBox 55">
+                <a:extLst>
+                  <a:ext uri="{FF2B5EF4-FFF2-40B4-BE49-F238E27FC236}">
+                    <a16:creationId xmlns:a16="http://schemas.microsoft.com/office/drawing/2014/main" id="{572E8742-149B-EF35-A281-96D220FBCDD6}"/>
+                  </a:ext>
+                </a:extLst>
+              </p:cNvPr>
+              <p:cNvSpPr txBox="1">
+                <a:spLocks noRot="1" noChangeAspect="1" noMove="1" noResize="1" noEditPoints="1" noAdjustHandles="1" noChangeArrowheads="1" noChangeShapeType="1" noTextEdit="1"/>
+              </p:cNvSpPr>
+              <p:nvPr/>
+            </p:nvSpPr>
+            <p:spPr>
+              <a:xfrm>
+                <a:off x="6575371" y="1490963"/>
+                <a:ext cx="4959401" cy="307777"/>
+              </a:xfrm>
+              <a:prstGeom prst="rect">
+                <a:avLst/>
+              </a:prstGeom>
+              <a:blipFill>
+                <a:blip r:embed="rId5"/>
+                <a:stretch>
+                  <a:fillRect l="-369" t="-4000" b="-20000"/>
+                </a:stretch>
+              </a:blipFill>
+            </p:spPr>
+            <p:txBody>
+              <a:bodyPr/>
+              <a:lstStyle/>
+              <a:p>
+                <a:r>
+                  <a:rPr lang="en-US">
+                    <a:noFill/>
+                  </a:rPr>
+                  <a:t> </a:t>
+                </a:r>
+              </a:p>
+            </p:txBody>
+          </p:sp>
+        </mc:Fallback>
+      </mc:AlternateContent>
+      <p:grpSp>
+        <p:nvGrpSpPr>
+          <p:cNvPr id="63" name="Group 62">
+            <a:extLst>
+              <a:ext uri="{FF2B5EF4-FFF2-40B4-BE49-F238E27FC236}">
+                <a16:creationId xmlns:a16="http://schemas.microsoft.com/office/drawing/2014/main" id="{F687D328-C359-4A67-B44E-B79F060926AB}"/>
+              </a:ext>
+            </a:extLst>
+          </p:cNvPr>
+          <p:cNvGrpSpPr/>
+          <p:nvPr/>
+        </p:nvGrpSpPr>
+        <p:grpSpPr>
+          <a:xfrm>
+            <a:off x="6680880" y="1962562"/>
+            <a:ext cx="4228832" cy="2355153"/>
+            <a:chOff x="1251331" y="1953394"/>
+            <a:chExt cx="3272155" cy="2008269"/>
+          </a:xfrm>
+        </p:grpSpPr>
+        <p:cxnSp>
+          <p:nvCxnSpPr>
+            <p:cNvPr id="64" name="Straight Connector 63">
+              <a:extLst>
+                <a:ext uri="{FF2B5EF4-FFF2-40B4-BE49-F238E27FC236}">
+                  <a16:creationId xmlns:a16="http://schemas.microsoft.com/office/drawing/2014/main" id="{7F984818-77DA-38E4-ABCD-0E32043DE5E4}"/>
+                </a:ext>
+              </a:extLst>
+            </p:cNvPr>
+            <p:cNvCxnSpPr>
+              <a:cxnSpLocks/>
+            </p:cNvCxnSpPr>
+            <p:nvPr/>
+          </p:nvCxnSpPr>
+          <p:spPr>
+            <a:xfrm>
+              <a:off x="1251331" y="3148491"/>
+              <a:ext cx="3272155" cy="0"/>
+            </a:xfrm>
+            <a:prstGeom prst="line">
+              <a:avLst/>
+            </a:prstGeom>
+            <a:ln w="57150"/>
+          </p:spPr>
+          <p:style>
+            <a:lnRef idx="2">
+              <a:schemeClr val="dk1"/>
+            </a:lnRef>
+            <a:fillRef idx="0">
+              <a:schemeClr val="dk1"/>
+            </a:fillRef>
+            <a:effectRef idx="1">
+              <a:schemeClr val="dk1"/>
+            </a:effectRef>
+            <a:fontRef idx="minor">
+              <a:schemeClr val="tx1"/>
+            </a:fontRef>
+          </p:style>
+        </p:cxnSp>
+        <p:sp>
+          <p:nvSpPr>
+            <p:cNvPr id="65" name="Oval 64">
+              <a:extLst>
+                <a:ext uri="{FF2B5EF4-FFF2-40B4-BE49-F238E27FC236}">
+                  <a16:creationId xmlns:a16="http://schemas.microsoft.com/office/drawing/2014/main" id="{F8EA4AAC-CD8F-C0A6-D319-F3B5D4C8A0AC}"/>
+                </a:ext>
+              </a:extLst>
+            </p:cNvPr>
+            <p:cNvSpPr/>
+            <p:nvPr/>
+          </p:nvSpPr>
+          <p:spPr>
+            <a:xfrm>
+              <a:off x="4189805" y="3148491"/>
+              <a:ext cx="268785" cy="287394"/>
+            </a:xfrm>
+            <a:prstGeom prst="ellipse">
+              <a:avLst/>
+            </a:prstGeom>
+            <a:solidFill>
+              <a:schemeClr val="dk1"/>
+            </a:solidFill>
+            <a:ln>
+              <a:noFill/>
+            </a:ln>
+          </p:spPr>
+          <p:style>
+            <a:lnRef idx="0">
+              <a:scrgbClr r="0" g="0" b="0"/>
+            </a:lnRef>
+            <a:fillRef idx="0">
+              <a:scrgbClr r="0" g="0" b="0"/>
+            </a:fillRef>
+            <a:effectRef idx="0">
+              <a:scrgbClr r="0" g="0" b="0"/>
+            </a:effectRef>
+            <a:fontRef idx="minor">
+              <a:schemeClr val="lt1"/>
+            </a:fontRef>
+          </p:style>
+          <p:txBody>
+            <a:bodyPr rtlCol="0" anchor="ctr"/>
+            <a:lstStyle/>
+            <a:p>
+              <a:pPr algn="ctr"/>
+              <a:endParaRPr lang="en-US" dirty="0"/>
+            </a:p>
+          </p:txBody>
+        </p:sp>
+        <p:sp>
+          <p:nvSpPr>
+            <p:cNvPr id="66" name="Isosceles Triangle 65">
+              <a:extLst>
+                <a:ext uri="{FF2B5EF4-FFF2-40B4-BE49-F238E27FC236}">
+                  <a16:creationId xmlns:a16="http://schemas.microsoft.com/office/drawing/2014/main" id="{CFA2031B-C92D-85DD-F287-A8ECAEE7257D}"/>
+                </a:ext>
+              </a:extLst>
+            </p:cNvPr>
+            <p:cNvSpPr/>
+            <p:nvPr/>
+          </p:nvSpPr>
+          <p:spPr>
+            <a:xfrm>
+              <a:off x="1277620" y="3148491"/>
+              <a:ext cx="246888" cy="261741"/>
+            </a:xfrm>
+            <a:prstGeom prst="triangle">
+              <a:avLst/>
+            </a:prstGeom>
+            <a:solidFill>
+              <a:schemeClr val="dk1"/>
+            </a:solidFill>
+            <a:ln>
+              <a:noFill/>
+            </a:ln>
+          </p:spPr>
+          <p:style>
+            <a:lnRef idx="0">
+              <a:scrgbClr r="0" g="0" b="0"/>
+            </a:lnRef>
+            <a:fillRef idx="0">
+              <a:scrgbClr r="0" g="0" b="0"/>
+            </a:fillRef>
+            <a:effectRef idx="0">
+              <a:scrgbClr r="0" g="0" b="0"/>
+            </a:effectRef>
+            <a:fontRef idx="minor">
+              <a:schemeClr val="lt1"/>
+            </a:fontRef>
+          </p:style>
+          <p:txBody>
+            <a:bodyPr rtlCol="0" anchor="ctr"/>
+            <a:lstStyle/>
+            <a:p>
+              <a:pPr algn="ctr"/>
+              <a:endParaRPr lang="en-US"/>
+            </a:p>
+          </p:txBody>
+        </p:sp>
+        <p:cxnSp>
+          <p:nvCxnSpPr>
+            <p:cNvPr id="67" name="Straight Arrow Connector 66">
+              <a:extLst>
+                <a:ext uri="{FF2B5EF4-FFF2-40B4-BE49-F238E27FC236}">
+                  <a16:creationId xmlns:a16="http://schemas.microsoft.com/office/drawing/2014/main" id="{B2A66B8F-E335-FB45-A60A-B23BB6D32856}"/>
+                </a:ext>
+              </a:extLst>
+            </p:cNvPr>
+            <p:cNvCxnSpPr/>
+            <p:nvPr/>
+          </p:nvCxnSpPr>
+          <p:spPr>
+            <a:xfrm>
+              <a:off x="2797315" y="2188372"/>
+              <a:ext cx="0" cy="960120"/>
+            </a:xfrm>
+            <a:prstGeom prst="straightConnector1">
+              <a:avLst/>
+            </a:prstGeom>
+            <a:ln w="38100">
+              <a:tailEnd type="triangle"/>
+            </a:ln>
+          </p:spPr>
+          <p:style>
+            <a:lnRef idx="1">
+              <a:schemeClr val="dk1"/>
+            </a:lnRef>
+            <a:fillRef idx="0">
+              <a:schemeClr val="dk1"/>
+            </a:fillRef>
+            <a:effectRef idx="0">
+              <a:schemeClr val="dk1"/>
+            </a:effectRef>
+            <a:fontRef idx="minor">
+              <a:schemeClr val="tx1"/>
+            </a:fontRef>
+          </p:style>
+        </p:cxnSp>
+        <p:cxnSp>
+          <p:nvCxnSpPr>
+            <p:cNvPr id="68" name="Straight Connector 67">
+              <a:extLst>
+                <a:ext uri="{FF2B5EF4-FFF2-40B4-BE49-F238E27FC236}">
+                  <a16:creationId xmlns:a16="http://schemas.microsoft.com/office/drawing/2014/main" id="{84FA15A2-16FB-1ED2-F415-B895229E7419}"/>
+                </a:ext>
+              </a:extLst>
+            </p:cNvPr>
+            <p:cNvCxnSpPr>
+              <a:cxnSpLocks/>
+            </p:cNvCxnSpPr>
+            <p:nvPr/>
+          </p:nvCxnSpPr>
+          <p:spPr>
+            <a:xfrm>
+              <a:off x="1392891" y="3664365"/>
+              <a:ext cx="2907792" cy="0"/>
+            </a:xfrm>
+            <a:prstGeom prst="line">
+              <a:avLst/>
+            </a:prstGeom>
+          </p:spPr>
+          <p:style>
+            <a:lnRef idx="2">
+              <a:schemeClr val="dk1"/>
+            </a:lnRef>
+            <a:fillRef idx="0">
+              <a:schemeClr val="dk1"/>
+            </a:fillRef>
+            <a:effectRef idx="1">
+              <a:schemeClr val="dk1"/>
+            </a:effectRef>
+            <a:fontRef idx="minor">
+              <a:schemeClr val="tx1"/>
+            </a:fontRef>
+          </p:style>
+        </p:cxnSp>
+        <p:sp>
+          <p:nvSpPr>
+            <p:cNvPr id="69" name="TextBox 68">
+              <a:extLst>
+                <a:ext uri="{FF2B5EF4-FFF2-40B4-BE49-F238E27FC236}">
+                  <a16:creationId xmlns:a16="http://schemas.microsoft.com/office/drawing/2014/main" id="{53B60F15-4065-29D3-FDD6-D6575322FC2C}"/>
+                </a:ext>
+              </a:extLst>
+            </p:cNvPr>
+            <p:cNvSpPr txBox="1"/>
+            <p:nvPr/>
+          </p:nvSpPr>
+          <p:spPr>
+            <a:xfrm>
+              <a:off x="2692874" y="3684664"/>
+              <a:ext cx="614271" cy="276999"/>
+            </a:xfrm>
+            <a:prstGeom prst="rect">
+              <a:avLst/>
+            </a:prstGeom>
+            <a:noFill/>
+          </p:spPr>
+          <p:txBody>
+            <a:bodyPr wrap="none" rtlCol="0">
+              <a:spAutoFit/>
+            </a:bodyPr>
+            <a:lstStyle/>
+            <a:p>
+              <a:r>
+                <a:rPr lang="en-US" sz="1200" dirty="0">
+                  <a:latin typeface="+mj-lt"/>
+                </a:rPr>
+                <a:t>L=10ft</a:t>
+              </a:r>
+            </a:p>
+          </p:txBody>
+        </p:sp>
+        <p:sp>
+          <p:nvSpPr>
+            <p:cNvPr id="70" name="TextBox 69">
+              <a:extLst>
+                <a:ext uri="{FF2B5EF4-FFF2-40B4-BE49-F238E27FC236}">
+                  <a16:creationId xmlns:a16="http://schemas.microsoft.com/office/drawing/2014/main" id="{ABC2E441-7F9B-AF24-B56B-47E9FF3F9ACE}"/>
+                </a:ext>
+              </a:extLst>
+            </p:cNvPr>
+            <p:cNvSpPr txBox="1"/>
+            <p:nvPr/>
+          </p:nvSpPr>
+          <p:spPr>
+            <a:xfrm>
+              <a:off x="2615944" y="1953394"/>
+              <a:ext cx="384065" cy="236201"/>
+            </a:xfrm>
+            <a:prstGeom prst="rect">
+              <a:avLst/>
+            </a:prstGeom>
+            <a:noFill/>
+          </p:spPr>
+          <p:txBody>
+            <a:bodyPr wrap="none" rtlCol="0">
+              <a:spAutoFit/>
+            </a:bodyPr>
+            <a:lstStyle/>
+            <a:p>
+              <a:r>
+                <a:rPr lang="en-US" sz="1200" dirty="0">
+                  <a:solidFill>
+                    <a:schemeClr val="tx2">
+                      <a:lumMod val="50000"/>
+                      <a:lumOff val="50000"/>
+                    </a:schemeClr>
+                  </a:solidFill>
+                  <a:latin typeface="+mj-lt"/>
+                </a:rPr>
+                <a:t>P = ?</a:t>
+              </a:r>
+            </a:p>
+          </p:txBody>
+        </p:sp>
+        <p:sp>
+          <p:nvSpPr>
+            <p:cNvPr id="71" name="Freeform: Shape 70">
+              <a:extLst>
+                <a:ext uri="{FF2B5EF4-FFF2-40B4-BE49-F238E27FC236}">
+                  <a16:creationId xmlns:a16="http://schemas.microsoft.com/office/drawing/2014/main" id="{2F31DEE6-E171-28A5-0EE3-7FA96FC22B59}"/>
+                </a:ext>
+              </a:extLst>
+            </p:cNvPr>
+            <p:cNvSpPr/>
+            <p:nvPr/>
+          </p:nvSpPr>
+          <p:spPr>
+            <a:xfrm>
+              <a:off x="1435608" y="3168789"/>
+              <a:ext cx="2812415" cy="397404"/>
+            </a:xfrm>
+            <a:custGeom>
+              <a:avLst/>
+              <a:gdLst>
+                <a:gd name="csX0" fmla="*/ 0 w 2889504"/>
+                <a:gd name="csY0" fmla="*/ 18288 h 420657"/>
+                <a:gd name="csX1" fmla="*/ 1399032 w 2889504"/>
+                <a:gd name="csY1" fmla="*/ 420624 h 420657"/>
+                <a:gd name="csX2" fmla="*/ 2889504 w 2889504"/>
+                <a:gd name="csY2" fmla="*/ 0 h 420657"/>
+              </a:gdLst>
+              <a:ahLst/>
+              <a:cxnLst>
+                <a:cxn ang="0">
+                  <a:pos x="csX0" y="csY0"/>
+                </a:cxn>
+                <a:cxn ang="0">
+                  <a:pos x="csX1" y="csY1"/>
+                </a:cxn>
+                <a:cxn ang="0">
+                  <a:pos x="csX2" y="csY2"/>
+                </a:cxn>
+              </a:cxnLst>
+              <a:rect l="l" t="t" r="r" b="b"/>
+              <a:pathLst>
+                <a:path w="2889504" h="420657">
+                  <a:moveTo>
+                    <a:pt x="0" y="18288"/>
+                  </a:moveTo>
+                  <a:cubicBezTo>
+                    <a:pt x="458724" y="220980"/>
+                    <a:pt x="917448" y="423672"/>
+                    <a:pt x="1399032" y="420624"/>
+                  </a:cubicBezTo>
+                  <a:cubicBezTo>
+                    <a:pt x="1880616" y="417576"/>
+                    <a:pt x="2631948" y="92964"/>
+                    <a:pt x="2889504" y="0"/>
+                  </a:cubicBezTo>
+                </a:path>
+              </a:pathLst>
+            </a:custGeom>
+            <a:ln w="28575">
+              <a:solidFill>
+                <a:schemeClr val="tx1"/>
+              </a:solidFill>
+              <a:prstDash val="sysDash"/>
+            </a:ln>
+          </p:spPr>
+          <p:style>
+            <a:lnRef idx="1">
+              <a:schemeClr val="accent4"/>
+            </a:lnRef>
+            <a:fillRef idx="0">
+              <a:schemeClr val="accent4"/>
+            </a:fillRef>
+            <a:effectRef idx="0">
+              <a:schemeClr val="accent4"/>
+            </a:effectRef>
+            <a:fontRef idx="minor">
+              <a:schemeClr val="tx1"/>
+            </a:fontRef>
+          </p:style>
+          <p:txBody>
+            <a:bodyPr rtlCol="0" anchor="ctr"/>
+            <a:lstStyle/>
+            <a:p>
+              <a:pPr algn="ctr"/>
+              <a:endParaRPr lang="en-US" dirty="0"/>
+            </a:p>
+          </p:txBody>
+        </p:sp>
+        <mc:AlternateContent xmlns:mc="http://schemas.openxmlformats.org/markup-compatibility/2006">
+          <mc:Choice xmlns:a14="http://schemas.microsoft.com/office/drawing/2010/main" Requires="a14">
+            <p:sp>
+              <p:nvSpPr>
+                <p:cNvPr id="72" name="TextBox 71">
+                  <a:extLst>
+                    <a:ext uri="{FF2B5EF4-FFF2-40B4-BE49-F238E27FC236}">
+                      <a16:creationId xmlns:a16="http://schemas.microsoft.com/office/drawing/2014/main" id="{A5F60896-810A-7BAB-7C8D-258D04A25AAF}"/>
+                    </a:ext>
+                  </a:extLst>
+                </p:cNvPr>
+                <p:cNvSpPr txBox="1"/>
+                <p:nvPr/>
+              </p:nvSpPr>
+              <p:spPr>
+                <a:xfrm>
+                  <a:off x="2773259" y="3220756"/>
+                  <a:ext cx="736476" cy="236201"/>
+                </a:xfrm>
+                <a:prstGeom prst="rect">
+                  <a:avLst/>
+                </a:prstGeom>
+                <a:noFill/>
+              </p:spPr>
+              <p:txBody>
+                <a:bodyPr wrap="none" rtlCol="0">
+                  <a:spAutoFit/>
+                </a:bodyPr>
+                <a:lstStyle/>
+                <a:p>
+                  <a14:m>
+                    <m:oMathPara xmlns:m="http://schemas.openxmlformats.org/officeDocument/2006/math">
+                      <m:oMathParaPr>
+                        <m:jc m:val="centerGroup"/>
+                      </m:oMathParaPr>
+                      <m:oMath xmlns:m="http://schemas.openxmlformats.org/officeDocument/2006/math">
+                        <m:sSub>
+                          <m:sSubPr>
+                            <m:ctrlPr>
+                              <a:rPr lang="en-US" sz="1200" b="0" i="0" smtClean="0">
+                                <a:solidFill>
+                                  <a:schemeClr val="tx1"/>
+                                </a:solidFill>
+                                <a:latin typeface="Cambria Math" panose="02040503050406030204" pitchFamily="18" charset="0"/>
+                              </a:rPr>
+                            </m:ctrlPr>
+                          </m:sSubPr>
+                          <m:e>
+                            <m:r>
+                              <a:rPr lang="en-US" sz="1200" b="0" i="1" smtClean="0">
+                                <a:solidFill>
+                                  <a:schemeClr val="tx1"/>
+                                </a:solidFill>
+                                <a:latin typeface="Cambria Math" panose="02040503050406030204" pitchFamily="18" charset="0"/>
+                              </a:rPr>
+                              <m:t>𝛿</m:t>
+                            </m:r>
+                          </m:e>
+                          <m:sub>
+                            <m:r>
+                              <m:rPr>
+                                <m:sty m:val="p"/>
+                              </m:rPr>
+                              <a:rPr lang="en-US" sz="1200" b="0" i="0" smtClean="0">
+                                <a:solidFill>
+                                  <a:schemeClr val="tx1"/>
+                                </a:solidFill>
+                                <a:latin typeface="Cambria Math" panose="02040503050406030204" pitchFamily="18" charset="0"/>
+                              </a:rPr>
+                              <m:t>max</m:t>
+                            </m:r>
+                          </m:sub>
+                        </m:sSub>
+                        <m:r>
+                          <a:rPr lang="en-US" sz="1200" b="0" i="0" smtClean="0">
+                            <a:solidFill>
+                              <a:schemeClr val="tx1"/>
+                            </a:solidFill>
+                            <a:latin typeface="Cambria Math" panose="02040503050406030204" pitchFamily="18" charset="0"/>
+                          </a:rPr>
+                          <m:t>=1</m:t>
+                        </m:r>
+                        <m:r>
+                          <m:rPr>
+                            <m:sty m:val="p"/>
+                          </m:rPr>
+                          <a:rPr lang="en-US" sz="1200" b="0" i="0" smtClean="0">
+                            <a:solidFill>
+                              <a:schemeClr val="tx1"/>
+                            </a:solidFill>
+                            <a:latin typeface="Cambria Math" panose="02040503050406030204" pitchFamily="18" charset="0"/>
+                          </a:rPr>
+                          <m:t>in</m:t>
+                        </m:r>
+                      </m:oMath>
+                    </m:oMathPara>
+                  </a14:m>
+                  <a:endParaRPr lang="en-US" sz="1200" dirty="0">
+                    <a:solidFill>
+                      <a:schemeClr val="tx1"/>
+                    </a:solidFill>
+                    <a:latin typeface="+mj-lt"/>
+                  </a:endParaRPr>
+                </a:p>
+              </p:txBody>
+            </p:sp>
+          </mc:Choice>
+          <mc:Fallback>
+            <p:sp>
+              <p:nvSpPr>
+                <p:cNvPr id="72" name="TextBox 71">
+                  <a:extLst>
+                    <a:ext uri="{FF2B5EF4-FFF2-40B4-BE49-F238E27FC236}">
+                      <a16:creationId xmlns:a16="http://schemas.microsoft.com/office/drawing/2014/main" id="{A5F60896-810A-7BAB-7C8D-258D04A25AAF}"/>
+                    </a:ext>
+                  </a:extLst>
+                </p:cNvPr>
+                <p:cNvSpPr txBox="1">
+                  <a:spLocks noRot="1" noChangeAspect="1" noMove="1" noResize="1" noEditPoints="1" noAdjustHandles="1" noChangeArrowheads="1" noChangeShapeType="1" noTextEdit="1"/>
+                </p:cNvSpPr>
+                <p:nvPr/>
+              </p:nvSpPr>
+              <p:spPr>
+                <a:xfrm>
+                  <a:off x="2773259" y="3220756"/>
+                  <a:ext cx="736476" cy="236201"/>
+                </a:xfrm>
+                <a:prstGeom prst="rect">
+                  <a:avLst/>
+                </a:prstGeom>
+                <a:blipFill>
+                  <a:blip r:embed="rId6"/>
+                  <a:stretch>
+                    <a:fillRect/>
+                  </a:stretch>
+                </a:blipFill>
+              </p:spPr>
+              <p:txBody>
+                <a:bodyPr/>
+                <a:lstStyle/>
+                <a:p>
+                  <a:r>
+                    <a:rPr lang="en-US">
+                      <a:noFill/>
+                    </a:rPr>
+                    <a:t> </a:t>
+                  </a:r>
+                </a:p>
+              </p:txBody>
+            </p:sp>
+          </mc:Fallback>
+        </mc:AlternateContent>
+        <p:cxnSp>
+          <p:nvCxnSpPr>
+            <p:cNvPr id="73" name="Straight Connector 72">
+              <a:extLst>
+                <a:ext uri="{FF2B5EF4-FFF2-40B4-BE49-F238E27FC236}">
+                  <a16:creationId xmlns:a16="http://schemas.microsoft.com/office/drawing/2014/main" id="{94C6BA57-4095-D68D-45CF-C75AA8333428}"/>
+                </a:ext>
+              </a:extLst>
+            </p:cNvPr>
+            <p:cNvCxnSpPr/>
+            <p:nvPr/>
+          </p:nvCxnSpPr>
+          <p:spPr>
+            <a:xfrm>
+              <a:off x="1393653" y="3560626"/>
+              <a:ext cx="0" cy="207478"/>
+            </a:xfrm>
+            <a:prstGeom prst="line">
+              <a:avLst/>
+            </a:prstGeom>
+          </p:spPr>
+          <p:style>
+            <a:lnRef idx="2">
+              <a:schemeClr val="dk1"/>
+            </a:lnRef>
+            <a:fillRef idx="0">
+              <a:schemeClr val="dk1"/>
+            </a:fillRef>
+            <a:effectRef idx="1">
+              <a:schemeClr val="dk1"/>
+            </a:effectRef>
+            <a:fontRef idx="minor">
+              <a:schemeClr val="tx1"/>
+            </a:fontRef>
+          </p:style>
+        </p:cxnSp>
+        <p:cxnSp>
+          <p:nvCxnSpPr>
+            <p:cNvPr id="74" name="Straight Connector 73">
+              <a:extLst>
+                <a:ext uri="{FF2B5EF4-FFF2-40B4-BE49-F238E27FC236}">
+                  <a16:creationId xmlns:a16="http://schemas.microsoft.com/office/drawing/2014/main" id="{6B1F8530-09BC-5B4A-2E3C-5F0B18B3039C}"/>
+                </a:ext>
+              </a:extLst>
+            </p:cNvPr>
+            <p:cNvCxnSpPr/>
+            <p:nvPr/>
+          </p:nvCxnSpPr>
+          <p:spPr>
+            <a:xfrm>
+              <a:off x="4300683" y="3560626"/>
+              <a:ext cx="0" cy="207478"/>
+            </a:xfrm>
+            <a:prstGeom prst="line">
+              <a:avLst/>
+            </a:prstGeom>
+          </p:spPr>
+          <p:style>
+            <a:lnRef idx="2">
+              <a:schemeClr val="dk1"/>
+            </a:lnRef>
+            <a:fillRef idx="0">
+              <a:schemeClr val="dk1"/>
+            </a:fillRef>
+            <a:effectRef idx="1">
+              <a:schemeClr val="dk1"/>
+            </a:effectRef>
+            <a:fontRef idx="minor">
+              <a:schemeClr val="tx1"/>
+            </a:fontRef>
+          </p:style>
+        </p:cxnSp>
+        <p:cxnSp>
+          <p:nvCxnSpPr>
+            <p:cNvPr id="75" name="Straight Connector 74">
+              <a:extLst>
+                <a:ext uri="{FF2B5EF4-FFF2-40B4-BE49-F238E27FC236}">
+                  <a16:creationId xmlns:a16="http://schemas.microsoft.com/office/drawing/2014/main" id="{07106F11-AA8B-A69F-EE37-D4F4DDDAC314}"/>
+                </a:ext>
+              </a:extLst>
+            </p:cNvPr>
+            <p:cNvCxnSpPr>
+              <a:cxnSpLocks/>
+              <a:endCxn id="71" idx="1"/>
+            </p:cNvCxnSpPr>
+            <p:nvPr/>
+          </p:nvCxnSpPr>
+          <p:spPr>
+            <a:xfrm>
+              <a:off x="2797315" y="3168789"/>
+              <a:ext cx="0" cy="397373"/>
+            </a:xfrm>
+            <a:prstGeom prst="line">
+              <a:avLst/>
+            </a:prstGeom>
+            <a:ln w="9525">
+              <a:solidFill>
+                <a:schemeClr val="tx1"/>
+              </a:solidFill>
+              <a:prstDash val="dash"/>
+            </a:ln>
+          </p:spPr>
+          <p:style>
+            <a:lnRef idx="2">
+              <a:schemeClr val="accent4"/>
+            </a:lnRef>
+            <a:fillRef idx="0">
+              <a:schemeClr val="accent4"/>
+            </a:fillRef>
+            <a:effectRef idx="1">
+              <a:schemeClr val="accent4"/>
+            </a:effectRef>
+            <a:fontRef idx="minor">
+              <a:schemeClr val="tx1"/>
+            </a:fontRef>
+          </p:style>
+        </p:cxnSp>
+      </p:grpSp>
+      <mc:AlternateContent xmlns:mc="http://schemas.openxmlformats.org/markup-compatibility/2006">
+        <mc:Choice xmlns:a14="http://schemas.microsoft.com/office/drawing/2010/main" Requires="a14">
+          <p:sp>
+            <p:nvSpPr>
+              <p:cNvPr id="76" name="TextBox 75">
+                <a:extLst>
+                  <a:ext uri="{FF2B5EF4-FFF2-40B4-BE49-F238E27FC236}">
+                    <a16:creationId xmlns:a16="http://schemas.microsoft.com/office/drawing/2014/main" id="{68DF0B13-A518-BEFF-CE6D-5EF6A76717A9}"/>
+                  </a:ext>
+                </a:extLst>
+              </p:cNvPr>
+              <p:cNvSpPr txBox="1"/>
+              <p:nvPr/>
+            </p:nvSpPr>
+            <p:spPr>
+              <a:xfrm>
+                <a:off x="7260422" y="4584230"/>
+                <a:ext cx="1350178" cy="501869"/>
+              </a:xfrm>
+              <a:prstGeom prst="rect">
+                <a:avLst/>
+              </a:prstGeom>
+              <a:noFill/>
+            </p:spPr>
+            <p:txBody>
+              <a:bodyPr wrap="none" rtlCol="0">
+                <a:spAutoFit/>
+              </a:bodyPr>
+              <a:lstStyle/>
+              <a:p>
+                <a14:m>
+                  <m:oMathPara xmlns:m="http://schemas.openxmlformats.org/officeDocument/2006/math">
+                    <m:oMathParaPr>
+                      <m:jc m:val="centerGroup"/>
+                    </m:oMathParaPr>
+                    <m:oMath xmlns:m="http://schemas.openxmlformats.org/officeDocument/2006/math">
+                      <m:r>
+                        <a:rPr lang="en-US" sz="1400" b="0" i="1" smtClean="0">
+                          <a:latin typeface="Cambria Math" panose="02040503050406030204" pitchFamily="18" charset="0"/>
+                        </a:rPr>
+                        <m:t>𝑃</m:t>
+                      </m:r>
+                      <m:r>
+                        <a:rPr lang="en-US" sz="1400" b="0" i="1" smtClean="0">
+                          <a:latin typeface="Cambria Math" panose="02040503050406030204" pitchFamily="18" charset="0"/>
+                        </a:rPr>
+                        <m:t>=</m:t>
+                      </m:r>
+                      <m:f>
+                        <m:fPr>
+                          <m:ctrlPr>
+                            <a:rPr lang="en-US" sz="1400" b="0" i="1" smtClean="0">
+                              <a:latin typeface="Cambria Math" panose="02040503050406030204" pitchFamily="18" charset="0"/>
+                            </a:rPr>
+                          </m:ctrlPr>
+                        </m:fPr>
+                        <m:num>
+                          <m:r>
+                            <a:rPr lang="en-US" sz="1400" b="0" i="1" smtClean="0">
+                              <a:latin typeface="Cambria Math" panose="02040503050406030204" pitchFamily="18" charset="0"/>
+                            </a:rPr>
+                            <m:t>48</m:t>
+                          </m:r>
+                          <m:r>
+                            <a:rPr lang="en-US" sz="1400" b="0" i="1" smtClean="0">
+                              <a:latin typeface="Cambria Math" panose="02040503050406030204" pitchFamily="18" charset="0"/>
+                            </a:rPr>
+                            <m:t>𝐸𝐼</m:t>
+                          </m:r>
+                          <m:sSub>
+                            <m:sSubPr>
+                              <m:ctrlPr>
+                                <a:rPr lang="en-US" sz="1400" b="0" i="1" smtClean="0">
+                                  <a:latin typeface="Cambria Math" panose="02040503050406030204" pitchFamily="18" charset="0"/>
+                                </a:rPr>
+                              </m:ctrlPr>
+                            </m:sSubPr>
+                            <m:e>
+                              <m:r>
+                                <a:rPr lang="en-US" sz="1400" b="0" i="1" smtClean="0">
+                                  <a:latin typeface="Cambria Math" panose="02040503050406030204" pitchFamily="18" charset="0"/>
+                                </a:rPr>
+                                <m:t>𝛿</m:t>
+                              </m:r>
+                            </m:e>
+                            <m:sub>
+                              <m:r>
+                                <a:rPr lang="en-US" sz="1400" b="0" i="1" smtClean="0">
+                                  <a:latin typeface="Cambria Math" panose="02040503050406030204" pitchFamily="18" charset="0"/>
+                                </a:rPr>
+                                <m:t>𝑚𝑎𝑥</m:t>
+                              </m:r>
+                            </m:sub>
+                          </m:sSub>
+                        </m:num>
+                        <m:den>
+                          <m:sSup>
+                            <m:sSupPr>
+                              <m:ctrlPr>
+                                <a:rPr lang="en-US" sz="1400" b="0" i="1" smtClean="0">
+                                  <a:latin typeface="Cambria Math" panose="02040503050406030204" pitchFamily="18" charset="0"/>
+                                </a:rPr>
+                              </m:ctrlPr>
+                            </m:sSupPr>
+                            <m:e>
+                              <m:r>
+                                <a:rPr lang="en-US" sz="1400" b="0" i="1" smtClean="0">
+                                  <a:latin typeface="Cambria Math" panose="02040503050406030204" pitchFamily="18" charset="0"/>
+                                </a:rPr>
+                                <m:t>𝐿</m:t>
+                              </m:r>
+                            </m:e>
+                            <m:sup>
+                              <m:r>
+                                <a:rPr lang="en-US" sz="1400" b="0" i="1" smtClean="0">
+                                  <a:latin typeface="Cambria Math" panose="02040503050406030204" pitchFamily="18" charset="0"/>
+                                </a:rPr>
+                                <m:t>3</m:t>
+                              </m:r>
+                            </m:sup>
+                          </m:sSup>
+                        </m:den>
+                      </m:f>
+                    </m:oMath>
+                  </m:oMathPara>
+                </a14:m>
+                <a:endParaRPr lang="en-US" sz="1400" dirty="0"/>
+              </a:p>
+            </p:txBody>
+          </p:sp>
+        </mc:Choice>
+        <mc:Fallback>
+          <p:sp>
+            <p:nvSpPr>
+              <p:cNvPr id="76" name="TextBox 75">
+                <a:extLst>
+                  <a:ext uri="{FF2B5EF4-FFF2-40B4-BE49-F238E27FC236}">
+                    <a16:creationId xmlns:a16="http://schemas.microsoft.com/office/drawing/2014/main" id="{68DF0B13-A518-BEFF-CE6D-5EF6A76717A9}"/>
+                  </a:ext>
+                </a:extLst>
+              </p:cNvPr>
+              <p:cNvSpPr txBox="1">
+                <a:spLocks noRot="1" noChangeAspect="1" noMove="1" noResize="1" noEditPoints="1" noAdjustHandles="1" noChangeArrowheads="1" noChangeShapeType="1" noTextEdit="1"/>
+              </p:cNvSpPr>
+              <p:nvPr/>
+            </p:nvSpPr>
+            <p:spPr>
+              <a:xfrm>
+                <a:off x="7260422" y="4584230"/>
+                <a:ext cx="1350178" cy="501869"/>
+              </a:xfrm>
+              <a:prstGeom prst="rect">
+                <a:avLst/>
+              </a:prstGeom>
+              <a:blipFill>
+                <a:blip r:embed="rId7"/>
+                <a:stretch>
+                  <a:fillRect b="-2439"/>
+                </a:stretch>
+              </a:blipFill>
+            </p:spPr>
+            <p:txBody>
+              <a:bodyPr/>
+              <a:lstStyle/>
+              <a:p>
+                <a:r>
+                  <a:rPr lang="en-US">
+                    <a:noFill/>
+                  </a:rPr>
+                  <a:t> </a:t>
+                </a:r>
+              </a:p>
+            </p:txBody>
+          </p:sp>
+        </mc:Fallback>
+      </mc:AlternateContent>
+      <p:sp>
+        <p:nvSpPr>
+          <p:cNvPr id="77" name="TextBox 76">
+            <a:extLst>
+              <a:ext uri="{FF2B5EF4-FFF2-40B4-BE49-F238E27FC236}">
+                <a16:creationId xmlns:a16="http://schemas.microsoft.com/office/drawing/2014/main" id="{4F38A6A8-6171-2482-C2D7-D72D2C201188}"/>
+              </a:ext>
+            </a:extLst>
+          </p:cNvPr>
+          <p:cNvSpPr txBox="1"/>
+          <p:nvPr/>
+        </p:nvSpPr>
+        <p:spPr>
+          <a:xfrm>
+            <a:off x="838200" y="6048375"/>
+            <a:ext cx="3980577" cy="369332"/>
+          </a:xfrm>
+          <a:prstGeom prst="rect">
+            <a:avLst/>
+          </a:prstGeom>
+          <a:noFill/>
+        </p:spPr>
+        <p:txBody>
+          <a:bodyPr wrap="none" rtlCol="0">
+            <a:spAutoFit/>
+          </a:bodyPr>
+          <a:lstStyle/>
+          <a:p>
+            <a:r>
+              <a:rPr lang="en-US" dirty="0"/>
+              <a:t>This is a well-posed inverse problem.</a:t>
+            </a:r>
+          </a:p>
+        </p:txBody>
+      </p:sp>
     </p:spTree>
     <p:extLst>
       <p:ext uri="{BB962C8B-B14F-4D97-AF65-F5344CB8AC3E}">
@@ -4501,6 +6491,780 @@
 </file>
 
 <file path=ppt/slides/slide3.xml><?xml version="1.0" encoding="utf-8"?>
+<p:sld xmlns:a="http://schemas.openxmlformats.org/drawingml/2006/main" xmlns:r="http://schemas.openxmlformats.org/officeDocument/2006/relationships" xmlns:p="http://schemas.openxmlformats.org/presentationml/2006/main">
+  <p:cSld>
+    <p:spTree>
+      <p:nvGrpSpPr>
+        <p:cNvPr id="1" name="">
+          <a:extLst>
+            <a:ext uri="{FF2B5EF4-FFF2-40B4-BE49-F238E27FC236}">
+              <a16:creationId xmlns:a16="http://schemas.microsoft.com/office/drawing/2014/main" id="{DBD1E7E0-B8AA-30E0-9452-E9D317D14C1A}"/>
+            </a:ext>
+          </a:extLst>
+        </p:cNvPr>
+        <p:cNvGrpSpPr/>
+        <p:nvPr/>
+      </p:nvGrpSpPr>
+      <p:grpSpPr>
+        <a:xfrm>
+          <a:off x="0" y="0"/>
+          <a:ext cx="0" cy="0"/>
+          <a:chOff x="0" y="0"/>
+          <a:chExt cx="0" cy="0"/>
+        </a:xfrm>
+      </p:grpSpPr>
+      <p:sp>
+        <p:nvSpPr>
+          <p:cNvPr id="2" name="Title 1">
+            <a:extLst>
+              <a:ext uri="{FF2B5EF4-FFF2-40B4-BE49-F238E27FC236}">
+                <a16:creationId xmlns:a16="http://schemas.microsoft.com/office/drawing/2014/main" id="{9C2793A7-6F8A-798D-4F96-84F964CD5B26}"/>
+              </a:ext>
+            </a:extLst>
+          </p:cNvPr>
+          <p:cNvSpPr>
+            <a:spLocks noGrp="1"/>
+          </p:cNvSpPr>
+          <p:nvPr>
+            <p:ph type="title"/>
+          </p:nvPr>
+        </p:nvSpPr>
+        <p:spPr/>
+        <p:txBody>
+          <a:bodyPr>
+            <a:normAutofit fontScale="90000"/>
+          </a:bodyPr>
+          <a:lstStyle/>
+          <a:p>
+            <a:r>
+              <a:rPr lang="en-US" dirty="0"/>
+              <a:t>Simple Beam Problem</a:t>
+            </a:r>
+          </a:p>
+        </p:txBody>
+      </p:sp>
+      <p:sp>
+        <p:nvSpPr>
+          <p:cNvPr id="3" name="Content Placeholder 2">
+            <a:extLst>
+              <a:ext uri="{FF2B5EF4-FFF2-40B4-BE49-F238E27FC236}">
+                <a16:creationId xmlns:a16="http://schemas.microsoft.com/office/drawing/2014/main" id="{C4864F45-3F08-A37F-BBFB-3B98B2D8BA96}"/>
+              </a:ext>
+            </a:extLst>
+          </p:cNvPr>
+          <p:cNvSpPr>
+            <a:spLocks noGrp="1"/>
+          </p:cNvSpPr>
+          <p:nvPr>
+            <p:ph idx="1"/>
+          </p:nvPr>
+        </p:nvSpPr>
+        <p:spPr/>
+        <p:txBody>
+          <a:bodyPr/>
+          <a:lstStyle/>
+          <a:p>
+            <a:pPr marL="0" indent="0">
+              <a:buNone/>
+            </a:pPr>
+            <a:r>
+              <a:rPr lang="en-US" dirty="0"/>
+              <a:t>Discussion</a:t>
+            </a:r>
+          </a:p>
+        </p:txBody>
+      </p:sp>
+      <p:sp>
+        <p:nvSpPr>
+          <p:cNvPr id="4" name="Slide Number Placeholder 3">
+            <a:extLst>
+              <a:ext uri="{FF2B5EF4-FFF2-40B4-BE49-F238E27FC236}">
+                <a16:creationId xmlns:a16="http://schemas.microsoft.com/office/drawing/2014/main" id="{502DED1B-281C-93F4-963B-E8B138A4AF27}"/>
+              </a:ext>
+            </a:extLst>
+          </p:cNvPr>
+          <p:cNvSpPr>
+            <a:spLocks noGrp="1"/>
+          </p:cNvSpPr>
+          <p:nvPr>
+            <p:ph type="sldNum" sz="quarter" idx="12"/>
+          </p:nvPr>
+        </p:nvSpPr>
+        <p:spPr/>
+        <p:txBody>
+          <a:bodyPr/>
+          <a:lstStyle/>
+          <a:p>
+            <a:fld id="{D95F4311-C1C1-468E-90BA-469E1A493750}" type="slidenum">
+              <a:rPr lang="en-US" smtClean="0"/>
+              <a:t>3</a:t>
+            </a:fld>
+            <a:endParaRPr lang="en-US"/>
+          </a:p>
+        </p:txBody>
+      </p:sp>
+      <p:grpSp>
+        <p:nvGrpSpPr>
+          <p:cNvPr id="6" name="Group 5">
+            <a:extLst>
+              <a:ext uri="{FF2B5EF4-FFF2-40B4-BE49-F238E27FC236}">
+                <a16:creationId xmlns:a16="http://schemas.microsoft.com/office/drawing/2014/main" id="{20CB4E61-06EA-0719-076A-7328358A227E}"/>
+              </a:ext>
+            </a:extLst>
+          </p:cNvPr>
+          <p:cNvGrpSpPr/>
+          <p:nvPr/>
+        </p:nvGrpSpPr>
+        <p:grpSpPr>
+          <a:xfrm>
+            <a:off x="3547155" y="2829374"/>
+            <a:ext cx="4228832" cy="2316797"/>
+            <a:chOff x="1251331" y="1945303"/>
+            <a:chExt cx="3272155" cy="1975562"/>
+          </a:xfrm>
+        </p:grpSpPr>
+        <p:cxnSp>
+          <p:nvCxnSpPr>
+            <p:cNvPr id="7" name="Straight Connector 6">
+              <a:extLst>
+                <a:ext uri="{FF2B5EF4-FFF2-40B4-BE49-F238E27FC236}">
+                  <a16:creationId xmlns:a16="http://schemas.microsoft.com/office/drawing/2014/main" id="{A46970CD-574B-A52A-65DD-A20C8EE8493C}"/>
+                </a:ext>
+              </a:extLst>
+            </p:cNvPr>
+            <p:cNvCxnSpPr>
+              <a:cxnSpLocks/>
+            </p:cNvCxnSpPr>
+            <p:nvPr/>
+          </p:nvCxnSpPr>
+          <p:spPr>
+            <a:xfrm>
+              <a:off x="1251331" y="3148491"/>
+              <a:ext cx="3272155" cy="0"/>
+            </a:xfrm>
+            <a:prstGeom prst="line">
+              <a:avLst/>
+            </a:prstGeom>
+            <a:ln w="57150"/>
+          </p:spPr>
+          <p:style>
+            <a:lnRef idx="2">
+              <a:schemeClr val="dk1"/>
+            </a:lnRef>
+            <a:fillRef idx="0">
+              <a:schemeClr val="dk1"/>
+            </a:fillRef>
+            <a:effectRef idx="1">
+              <a:schemeClr val="dk1"/>
+            </a:effectRef>
+            <a:fontRef idx="minor">
+              <a:schemeClr val="tx1"/>
+            </a:fontRef>
+          </p:style>
+        </p:cxnSp>
+        <p:sp>
+          <p:nvSpPr>
+            <p:cNvPr id="8" name="Oval 7">
+              <a:extLst>
+                <a:ext uri="{FF2B5EF4-FFF2-40B4-BE49-F238E27FC236}">
+                  <a16:creationId xmlns:a16="http://schemas.microsoft.com/office/drawing/2014/main" id="{04CA41A5-A6CB-9586-B9C9-4B9441D21820}"/>
+                </a:ext>
+              </a:extLst>
+            </p:cNvPr>
+            <p:cNvSpPr/>
+            <p:nvPr/>
+          </p:nvSpPr>
+          <p:spPr>
+            <a:xfrm>
+              <a:off x="4189805" y="3148491"/>
+              <a:ext cx="268785" cy="287394"/>
+            </a:xfrm>
+            <a:prstGeom prst="ellipse">
+              <a:avLst/>
+            </a:prstGeom>
+            <a:solidFill>
+              <a:schemeClr val="dk1"/>
+            </a:solidFill>
+            <a:ln>
+              <a:noFill/>
+            </a:ln>
+          </p:spPr>
+          <p:style>
+            <a:lnRef idx="0">
+              <a:scrgbClr r="0" g="0" b="0"/>
+            </a:lnRef>
+            <a:fillRef idx="0">
+              <a:scrgbClr r="0" g="0" b="0"/>
+            </a:fillRef>
+            <a:effectRef idx="0">
+              <a:scrgbClr r="0" g="0" b="0"/>
+            </a:effectRef>
+            <a:fontRef idx="minor">
+              <a:schemeClr val="lt1"/>
+            </a:fontRef>
+          </p:style>
+          <p:txBody>
+            <a:bodyPr rtlCol="0" anchor="ctr"/>
+            <a:lstStyle/>
+            <a:p>
+              <a:pPr algn="ctr"/>
+              <a:endParaRPr lang="en-US" dirty="0"/>
+            </a:p>
+          </p:txBody>
+        </p:sp>
+        <p:sp>
+          <p:nvSpPr>
+            <p:cNvPr id="9" name="Isosceles Triangle 8">
+              <a:extLst>
+                <a:ext uri="{FF2B5EF4-FFF2-40B4-BE49-F238E27FC236}">
+                  <a16:creationId xmlns:a16="http://schemas.microsoft.com/office/drawing/2014/main" id="{F3FD6BB4-194D-40D2-04D6-EAC7DA15FFED}"/>
+                </a:ext>
+              </a:extLst>
+            </p:cNvPr>
+            <p:cNvSpPr/>
+            <p:nvPr/>
+          </p:nvSpPr>
+          <p:spPr>
+            <a:xfrm>
+              <a:off x="1277620" y="3148491"/>
+              <a:ext cx="246888" cy="261741"/>
+            </a:xfrm>
+            <a:prstGeom prst="triangle">
+              <a:avLst/>
+            </a:prstGeom>
+            <a:solidFill>
+              <a:schemeClr val="dk1"/>
+            </a:solidFill>
+            <a:ln>
+              <a:noFill/>
+            </a:ln>
+          </p:spPr>
+          <p:style>
+            <a:lnRef idx="0">
+              <a:scrgbClr r="0" g="0" b="0"/>
+            </a:lnRef>
+            <a:fillRef idx="0">
+              <a:scrgbClr r="0" g="0" b="0"/>
+            </a:fillRef>
+            <a:effectRef idx="0">
+              <a:scrgbClr r="0" g="0" b="0"/>
+            </a:effectRef>
+            <a:fontRef idx="minor">
+              <a:schemeClr val="lt1"/>
+            </a:fontRef>
+          </p:style>
+          <p:txBody>
+            <a:bodyPr rtlCol="0" anchor="ctr"/>
+            <a:lstStyle/>
+            <a:p>
+              <a:pPr algn="ctr"/>
+              <a:endParaRPr lang="en-US"/>
+            </a:p>
+          </p:txBody>
+        </p:sp>
+        <p:cxnSp>
+          <p:nvCxnSpPr>
+            <p:cNvPr id="10" name="Straight Arrow Connector 9">
+              <a:extLst>
+                <a:ext uri="{FF2B5EF4-FFF2-40B4-BE49-F238E27FC236}">
+                  <a16:creationId xmlns:a16="http://schemas.microsoft.com/office/drawing/2014/main" id="{368CD24F-782A-E737-FCF5-5AEB6DBB49FE}"/>
+                </a:ext>
+              </a:extLst>
+            </p:cNvPr>
+            <p:cNvCxnSpPr/>
+            <p:nvPr/>
+          </p:nvCxnSpPr>
+          <p:spPr>
+            <a:xfrm>
+              <a:off x="2797315" y="2188372"/>
+              <a:ext cx="0" cy="960120"/>
+            </a:xfrm>
+            <a:prstGeom prst="straightConnector1">
+              <a:avLst/>
+            </a:prstGeom>
+            <a:ln w="38100">
+              <a:tailEnd type="triangle"/>
+            </a:ln>
+          </p:spPr>
+          <p:style>
+            <a:lnRef idx="1">
+              <a:schemeClr val="dk1"/>
+            </a:lnRef>
+            <a:fillRef idx="0">
+              <a:schemeClr val="dk1"/>
+            </a:fillRef>
+            <a:effectRef idx="0">
+              <a:schemeClr val="dk1"/>
+            </a:effectRef>
+            <a:fontRef idx="minor">
+              <a:schemeClr val="tx1"/>
+            </a:fontRef>
+          </p:style>
+        </p:cxnSp>
+        <p:cxnSp>
+          <p:nvCxnSpPr>
+            <p:cNvPr id="11" name="Straight Connector 10">
+              <a:extLst>
+                <a:ext uri="{FF2B5EF4-FFF2-40B4-BE49-F238E27FC236}">
+                  <a16:creationId xmlns:a16="http://schemas.microsoft.com/office/drawing/2014/main" id="{459B1C93-B123-F244-F98A-51D4686C4B06}"/>
+                </a:ext>
+              </a:extLst>
+            </p:cNvPr>
+            <p:cNvCxnSpPr>
+              <a:cxnSpLocks/>
+            </p:cNvCxnSpPr>
+            <p:nvPr/>
+          </p:nvCxnSpPr>
+          <p:spPr>
+            <a:xfrm>
+              <a:off x="1392891" y="3664365"/>
+              <a:ext cx="2907792" cy="0"/>
+            </a:xfrm>
+            <a:prstGeom prst="line">
+              <a:avLst/>
+            </a:prstGeom>
+          </p:spPr>
+          <p:style>
+            <a:lnRef idx="2">
+              <a:schemeClr val="dk1"/>
+            </a:lnRef>
+            <a:fillRef idx="0">
+              <a:schemeClr val="dk1"/>
+            </a:fillRef>
+            <a:effectRef idx="1">
+              <a:schemeClr val="dk1"/>
+            </a:effectRef>
+            <a:fontRef idx="minor">
+              <a:schemeClr val="tx1"/>
+            </a:fontRef>
+          </p:style>
+        </p:cxnSp>
+        <p:sp>
+          <p:nvSpPr>
+            <p:cNvPr id="12" name="TextBox 11">
+              <a:extLst>
+                <a:ext uri="{FF2B5EF4-FFF2-40B4-BE49-F238E27FC236}">
+                  <a16:creationId xmlns:a16="http://schemas.microsoft.com/office/drawing/2014/main" id="{441D9579-37D5-FD3A-0D44-06BB5F1193C6}"/>
+                </a:ext>
+              </a:extLst>
+            </p:cNvPr>
+            <p:cNvSpPr txBox="1"/>
+            <p:nvPr/>
+          </p:nvSpPr>
+          <p:spPr>
+            <a:xfrm>
+              <a:off x="2692874" y="3684664"/>
+              <a:ext cx="216071" cy="236201"/>
+            </a:xfrm>
+            <a:prstGeom prst="rect">
+              <a:avLst/>
+            </a:prstGeom>
+            <a:noFill/>
+          </p:spPr>
+          <p:txBody>
+            <a:bodyPr wrap="none" rtlCol="0">
+              <a:spAutoFit/>
+            </a:bodyPr>
+            <a:lstStyle/>
+            <a:p>
+              <a:r>
+                <a:rPr lang="en-US" sz="1200" dirty="0">
+                  <a:latin typeface="+mj-lt"/>
+                </a:rPr>
+                <a:t>L</a:t>
+              </a:r>
+            </a:p>
+          </p:txBody>
+        </p:sp>
+        <p:sp>
+          <p:nvSpPr>
+            <p:cNvPr id="13" name="TextBox 12">
+              <a:extLst>
+                <a:ext uri="{FF2B5EF4-FFF2-40B4-BE49-F238E27FC236}">
+                  <a16:creationId xmlns:a16="http://schemas.microsoft.com/office/drawing/2014/main" id="{645FD98F-6B25-F59F-FCE8-F8743701F94B}"/>
+                </a:ext>
+              </a:extLst>
+            </p:cNvPr>
+            <p:cNvSpPr txBox="1"/>
+            <p:nvPr/>
+          </p:nvSpPr>
+          <p:spPr>
+            <a:xfrm>
+              <a:off x="2693000" y="1945303"/>
+              <a:ext cx="208629" cy="236201"/>
+            </a:xfrm>
+            <a:prstGeom prst="rect">
+              <a:avLst/>
+            </a:prstGeom>
+            <a:noFill/>
+          </p:spPr>
+          <p:txBody>
+            <a:bodyPr wrap="none" rtlCol="0">
+              <a:spAutoFit/>
+            </a:bodyPr>
+            <a:lstStyle/>
+            <a:p>
+              <a:r>
+                <a:rPr lang="en-US" sz="1200" dirty="0">
+                  <a:latin typeface="+mj-lt"/>
+                </a:rPr>
+                <a:t>P</a:t>
+              </a:r>
+            </a:p>
+          </p:txBody>
+        </p:sp>
+        <p:sp>
+          <p:nvSpPr>
+            <p:cNvPr id="14" name="Freeform: Shape 13">
+              <a:extLst>
+                <a:ext uri="{FF2B5EF4-FFF2-40B4-BE49-F238E27FC236}">
+                  <a16:creationId xmlns:a16="http://schemas.microsoft.com/office/drawing/2014/main" id="{49238A81-58D0-40F0-5645-AB25CD644399}"/>
+                </a:ext>
+              </a:extLst>
+            </p:cNvPr>
+            <p:cNvSpPr/>
+            <p:nvPr/>
+          </p:nvSpPr>
+          <p:spPr>
+            <a:xfrm>
+              <a:off x="1435608" y="3168789"/>
+              <a:ext cx="2812415" cy="397404"/>
+            </a:xfrm>
+            <a:custGeom>
+              <a:avLst/>
+              <a:gdLst>
+                <a:gd name="csX0" fmla="*/ 0 w 2889504"/>
+                <a:gd name="csY0" fmla="*/ 18288 h 420657"/>
+                <a:gd name="csX1" fmla="*/ 1399032 w 2889504"/>
+                <a:gd name="csY1" fmla="*/ 420624 h 420657"/>
+                <a:gd name="csX2" fmla="*/ 2889504 w 2889504"/>
+                <a:gd name="csY2" fmla="*/ 0 h 420657"/>
+              </a:gdLst>
+              <a:ahLst/>
+              <a:cxnLst>
+                <a:cxn ang="0">
+                  <a:pos x="csX0" y="csY0"/>
+                </a:cxn>
+                <a:cxn ang="0">
+                  <a:pos x="csX1" y="csY1"/>
+                </a:cxn>
+                <a:cxn ang="0">
+                  <a:pos x="csX2" y="csY2"/>
+                </a:cxn>
+              </a:cxnLst>
+              <a:rect l="l" t="t" r="r" b="b"/>
+              <a:pathLst>
+                <a:path w="2889504" h="420657">
+                  <a:moveTo>
+                    <a:pt x="0" y="18288"/>
+                  </a:moveTo>
+                  <a:cubicBezTo>
+                    <a:pt x="458724" y="220980"/>
+                    <a:pt x="917448" y="423672"/>
+                    <a:pt x="1399032" y="420624"/>
+                  </a:cubicBezTo>
+                  <a:cubicBezTo>
+                    <a:pt x="1880616" y="417576"/>
+                    <a:pt x="2631948" y="92964"/>
+                    <a:pt x="2889504" y="0"/>
+                  </a:cubicBezTo>
+                </a:path>
+              </a:pathLst>
+            </a:custGeom>
+            <a:ln w="28575">
+              <a:solidFill>
+                <a:schemeClr val="tx1"/>
+              </a:solidFill>
+              <a:prstDash val="sysDash"/>
+            </a:ln>
+          </p:spPr>
+          <p:style>
+            <a:lnRef idx="1">
+              <a:schemeClr val="accent4"/>
+            </a:lnRef>
+            <a:fillRef idx="0">
+              <a:schemeClr val="accent4"/>
+            </a:fillRef>
+            <a:effectRef idx="0">
+              <a:schemeClr val="accent4"/>
+            </a:effectRef>
+            <a:fontRef idx="minor">
+              <a:schemeClr val="tx1"/>
+            </a:fontRef>
+          </p:style>
+          <p:txBody>
+            <a:bodyPr rtlCol="0" anchor="ctr"/>
+            <a:lstStyle/>
+            <a:p>
+              <a:pPr algn="ctr"/>
+              <a:endParaRPr lang="en-US" dirty="0"/>
+            </a:p>
+          </p:txBody>
+        </p:sp>
+        <mc:AlternateContent xmlns:mc="http://schemas.openxmlformats.org/markup-compatibility/2006">
+          <mc:Choice xmlns:a14="http://schemas.microsoft.com/office/drawing/2010/main" Requires="a14">
+            <p:sp>
+              <p:nvSpPr>
+                <p:cNvPr id="15" name="TextBox 14">
+                  <a:extLst>
+                    <a:ext uri="{FF2B5EF4-FFF2-40B4-BE49-F238E27FC236}">
+                      <a16:creationId xmlns:a16="http://schemas.microsoft.com/office/drawing/2014/main" id="{EA48CD03-CF4E-A788-8557-B5EDC5B50377}"/>
+                    </a:ext>
+                  </a:extLst>
+                </p:cNvPr>
+                <p:cNvSpPr txBox="1"/>
+                <p:nvPr/>
+              </p:nvSpPr>
+              <p:spPr>
+                <a:xfrm>
+                  <a:off x="2773259" y="3220756"/>
+                  <a:ext cx="414776" cy="236201"/>
+                </a:xfrm>
+                <a:prstGeom prst="rect">
+                  <a:avLst/>
+                </a:prstGeom>
+                <a:noFill/>
+              </p:spPr>
+              <p:txBody>
+                <a:bodyPr wrap="none" rtlCol="0">
+                  <a:spAutoFit/>
+                </a:bodyPr>
+                <a:lstStyle/>
+                <a:p>
+                  <a:pPr/>
+                  <a14:m>
+                    <m:oMathPara xmlns:m="http://schemas.openxmlformats.org/officeDocument/2006/math">
+                      <m:oMathParaPr>
+                        <m:jc m:val="centerGroup"/>
+                      </m:oMathParaPr>
+                      <m:oMath xmlns:m="http://schemas.openxmlformats.org/officeDocument/2006/math">
+                        <m:sSub>
+                          <m:sSubPr>
+                            <m:ctrlPr>
+                              <a:rPr lang="en-US" sz="1200" b="0" i="1" smtClean="0">
+                                <a:solidFill>
+                                  <a:schemeClr val="tx1"/>
+                                </a:solidFill>
+                                <a:latin typeface="Cambria Math" panose="02040503050406030204" pitchFamily="18" charset="0"/>
+                              </a:rPr>
+                            </m:ctrlPr>
+                          </m:sSubPr>
+                          <m:e>
+                            <m:r>
+                              <a:rPr lang="en-US" sz="1200" b="0" i="1" smtClean="0">
+                                <a:solidFill>
+                                  <a:schemeClr val="tx1"/>
+                                </a:solidFill>
+                                <a:latin typeface="Cambria Math" panose="02040503050406030204" pitchFamily="18" charset="0"/>
+                              </a:rPr>
+                              <m:t>𝛿</m:t>
+                            </m:r>
+                          </m:e>
+                          <m:sub>
+                            <m:r>
+                              <m:rPr>
+                                <m:sty m:val="p"/>
+                              </m:rPr>
+                              <a:rPr lang="en-US" sz="1200" b="0" i="0" smtClean="0">
+                                <a:solidFill>
+                                  <a:schemeClr val="tx1"/>
+                                </a:solidFill>
+                                <a:latin typeface="Cambria Math" panose="02040503050406030204" pitchFamily="18" charset="0"/>
+                              </a:rPr>
+                              <m:t>max</m:t>
+                            </m:r>
+                          </m:sub>
+                        </m:sSub>
+                      </m:oMath>
+                    </m:oMathPara>
+                  </a14:m>
+                  <a:endParaRPr lang="en-US" sz="1200" dirty="0">
+                    <a:solidFill>
+                      <a:schemeClr val="tx1"/>
+                    </a:solidFill>
+                    <a:latin typeface="+mj-lt"/>
+                  </a:endParaRPr>
+                </a:p>
+              </p:txBody>
+            </p:sp>
+          </mc:Choice>
+          <mc:Fallback>
+            <p:sp>
+              <p:nvSpPr>
+                <p:cNvPr id="15" name="TextBox 14">
+                  <a:extLst>
+                    <a:ext uri="{FF2B5EF4-FFF2-40B4-BE49-F238E27FC236}">
+                      <a16:creationId xmlns:a16="http://schemas.microsoft.com/office/drawing/2014/main" id="{EA48CD03-CF4E-A788-8557-B5EDC5B50377}"/>
+                    </a:ext>
+                  </a:extLst>
+                </p:cNvPr>
+                <p:cNvSpPr txBox="1">
+                  <a:spLocks noRot="1" noChangeAspect="1" noMove="1" noResize="1" noEditPoints="1" noAdjustHandles="1" noChangeArrowheads="1" noChangeShapeType="1" noTextEdit="1"/>
+                </p:cNvSpPr>
+                <p:nvPr/>
+              </p:nvSpPr>
+              <p:spPr>
+                <a:xfrm>
+                  <a:off x="2773259" y="3220756"/>
+                  <a:ext cx="414776" cy="236201"/>
+                </a:xfrm>
+                <a:prstGeom prst="rect">
+                  <a:avLst/>
+                </a:prstGeom>
+                <a:blipFill>
+                  <a:blip r:embed="rId2"/>
+                  <a:stretch>
+                    <a:fillRect/>
+                  </a:stretch>
+                </a:blipFill>
+              </p:spPr>
+              <p:txBody>
+                <a:bodyPr/>
+                <a:lstStyle/>
+                <a:p>
+                  <a:r>
+                    <a:rPr lang="en-US">
+                      <a:noFill/>
+                    </a:rPr>
+                    <a:t> </a:t>
+                  </a:r>
+                </a:p>
+              </p:txBody>
+            </p:sp>
+          </mc:Fallback>
+        </mc:AlternateContent>
+        <p:cxnSp>
+          <p:nvCxnSpPr>
+            <p:cNvPr id="16" name="Straight Connector 15">
+              <a:extLst>
+                <a:ext uri="{FF2B5EF4-FFF2-40B4-BE49-F238E27FC236}">
+                  <a16:creationId xmlns:a16="http://schemas.microsoft.com/office/drawing/2014/main" id="{3AEC41B6-FDE2-94B6-8284-3986D0542D42}"/>
+                </a:ext>
+              </a:extLst>
+            </p:cNvPr>
+            <p:cNvCxnSpPr/>
+            <p:nvPr/>
+          </p:nvCxnSpPr>
+          <p:spPr>
+            <a:xfrm>
+              <a:off x="1393653" y="3560626"/>
+              <a:ext cx="0" cy="207478"/>
+            </a:xfrm>
+            <a:prstGeom prst="line">
+              <a:avLst/>
+            </a:prstGeom>
+          </p:spPr>
+          <p:style>
+            <a:lnRef idx="2">
+              <a:schemeClr val="dk1"/>
+            </a:lnRef>
+            <a:fillRef idx="0">
+              <a:schemeClr val="dk1"/>
+            </a:fillRef>
+            <a:effectRef idx="1">
+              <a:schemeClr val="dk1"/>
+            </a:effectRef>
+            <a:fontRef idx="minor">
+              <a:schemeClr val="tx1"/>
+            </a:fontRef>
+          </p:style>
+        </p:cxnSp>
+        <p:cxnSp>
+          <p:nvCxnSpPr>
+            <p:cNvPr id="17" name="Straight Connector 16">
+              <a:extLst>
+                <a:ext uri="{FF2B5EF4-FFF2-40B4-BE49-F238E27FC236}">
+                  <a16:creationId xmlns:a16="http://schemas.microsoft.com/office/drawing/2014/main" id="{BC4FE408-A6A7-11FF-02B4-8F0B1152E5F8}"/>
+                </a:ext>
+              </a:extLst>
+            </p:cNvPr>
+            <p:cNvCxnSpPr/>
+            <p:nvPr/>
+          </p:nvCxnSpPr>
+          <p:spPr>
+            <a:xfrm>
+              <a:off x="4300683" y="3560626"/>
+              <a:ext cx="0" cy="207478"/>
+            </a:xfrm>
+            <a:prstGeom prst="line">
+              <a:avLst/>
+            </a:prstGeom>
+          </p:spPr>
+          <p:style>
+            <a:lnRef idx="2">
+              <a:schemeClr val="dk1"/>
+            </a:lnRef>
+            <a:fillRef idx="0">
+              <a:schemeClr val="dk1"/>
+            </a:fillRef>
+            <a:effectRef idx="1">
+              <a:schemeClr val="dk1"/>
+            </a:effectRef>
+            <a:fontRef idx="minor">
+              <a:schemeClr val="tx1"/>
+            </a:fontRef>
+          </p:style>
+        </p:cxnSp>
+        <p:cxnSp>
+          <p:nvCxnSpPr>
+            <p:cNvPr id="18" name="Straight Connector 17">
+              <a:extLst>
+                <a:ext uri="{FF2B5EF4-FFF2-40B4-BE49-F238E27FC236}">
+                  <a16:creationId xmlns:a16="http://schemas.microsoft.com/office/drawing/2014/main" id="{EA14D21C-0C43-493C-6138-F0F38F2468BF}"/>
+                </a:ext>
+              </a:extLst>
+            </p:cNvPr>
+            <p:cNvCxnSpPr>
+              <a:cxnSpLocks/>
+              <a:endCxn id="14" idx="1"/>
+            </p:cNvCxnSpPr>
+            <p:nvPr/>
+          </p:nvCxnSpPr>
+          <p:spPr>
+            <a:xfrm>
+              <a:off x="2797315" y="3168789"/>
+              <a:ext cx="0" cy="397373"/>
+            </a:xfrm>
+            <a:prstGeom prst="line">
+              <a:avLst/>
+            </a:prstGeom>
+            <a:ln w="9525">
+              <a:solidFill>
+                <a:schemeClr val="tx1"/>
+              </a:solidFill>
+              <a:prstDash val="dash"/>
+            </a:ln>
+          </p:spPr>
+          <p:style>
+            <a:lnRef idx="2">
+              <a:schemeClr val="accent4"/>
+            </a:lnRef>
+            <a:fillRef idx="0">
+              <a:schemeClr val="accent4"/>
+            </a:fillRef>
+            <a:effectRef idx="1">
+              <a:schemeClr val="accent4"/>
+            </a:effectRef>
+            <a:fontRef idx="minor">
+              <a:schemeClr val="tx1"/>
+            </a:fontRef>
+          </p:style>
+        </p:cxnSp>
+      </p:grpSp>
+    </p:spTree>
+    <p:extLst>
+      <p:ext uri="{BB962C8B-B14F-4D97-AF65-F5344CB8AC3E}">
+        <p14:creationId xmlns:p14="http://schemas.microsoft.com/office/powerpoint/2010/main" val="2052059140"/>
+      </p:ext>
+    </p:extLst>
+  </p:cSld>
+  <p:clrMapOvr>
+    <a:masterClrMapping/>
+  </p:clrMapOvr>
+</p:sld>
+</file>
+
+<file path=ppt/slides/slide4.xml><?xml version="1.0" encoding="utf-8"?>
 <p:sld xmlns:a="http://schemas.openxmlformats.org/drawingml/2006/main" xmlns:r="http://schemas.openxmlformats.org/officeDocument/2006/relationships" xmlns:p="http://schemas.openxmlformats.org/presentationml/2006/main">
   <p:cSld>
     <p:spTree>
@@ -4555,34 +7319,6 @@
       </p:sp>
       <p:sp>
         <p:nvSpPr>
-          <p:cNvPr id="3" name="Content Placeholder 2">
-            <a:extLst>
-              <a:ext uri="{FF2B5EF4-FFF2-40B4-BE49-F238E27FC236}">
-                <a16:creationId xmlns:a16="http://schemas.microsoft.com/office/drawing/2014/main" id="{B15F72E0-1FD3-0C12-8E14-1BC54AEC1C4F}"/>
-              </a:ext>
-            </a:extLst>
-          </p:cNvPr>
-          <p:cNvSpPr>
-            <a:spLocks noGrp="1"/>
-          </p:cNvSpPr>
-          <p:nvPr>
-            <p:ph idx="1"/>
-          </p:nvPr>
-        </p:nvSpPr>
-        <p:spPr/>
-        <p:txBody>
-          <a:bodyPr/>
-          <a:lstStyle/>
-          <a:p>
-            <a:pPr marL="0" indent="0">
-              <a:buNone/>
-            </a:pPr>
-            <a:endParaRPr lang="en-US" dirty="0"/>
-          </a:p>
-        </p:txBody>
-      </p:sp>
-      <p:sp>
-        <p:nvSpPr>
           <p:cNvPr id="4" name="Slide Number Placeholder 3">
             <a:extLst>
               <a:ext uri="{FF2B5EF4-FFF2-40B4-BE49-F238E27FC236}">
@@ -4604,12 +7340,713 @@
           <a:p>
             <a:fld id="{D95F4311-C1C1-468E-90BA-469E1A493750}" type="slidenum">
               <a:rPr lang="en-US" smtClean="0"/>
-              <a:t>3</a:t>
+              <a:t>4</a:t>
             </a:fld>
             <a:endParaRPr lang="en-US"/>
           </a:p>
         </p:txBody>
       </p:sp>
+      <p:grpSp>
+        <p:nvGrpSpPr>
+          <p:cNvPr id="5" name="Group 4">
+            <a:extLst>
+              <a:ext uri="{FF2B5EF4-FFF2-40B4-BE49-F238E27FC236}">
+                <a16:creationId xmlns:a16="http://schemas.microsoft.com/office/drawing/2014/main" id="{4352AE2F-73E3-3B21-1584-A2276E5654E6}"/>
+              </a:ext>
+            </a:extLst>
+          </p:cNvPr>
+          <p:cNvGrpSpPr/>
+          <p:nvPr/>
+        </p:nvGrpSpPr>
+        <p:grpSpPr>
+          <a:xfrm>
+            <a:off x="4023519" y="2270601"/>
+            <a:ext cx="4144962" cy="2316797"/>
+            <a:chOff x="1251331" y="1945303"/>
+            <a:chExt cx="3207259" cy="1975562"/>
+          </a:xfrm>
+        </p:grpSpPr>
+        <p:cxnSp>
+          <p:nvCxnSpPr>
+            <p:cNvPr id="6" name="Straight Connector 5">
+              <a:extLst>
+                <a:ext uri="{FF2B5EF4-FFF2-40B4-BE49-F238E27FC236}">
+                  <a16:creationId xmlns:a16="http://schemas.microsoft.com/office/drawing/2014/main" id="{AE70D61D-3BA9-6B0D-4F03-E85D98AF3C88}"/>
+                </a:ext>
+              </a:extLst>
+            </p:cNvPr>
+            <p:cNvCxnSpPr>
+              <a:cxnSpLocks/>
+            </p:cNvCxnSpPr>
+            <p:nvPr/>
+          </p:nvCxnSpPr>
+          <p:spPr>
+            <a:xfrm>
+              <a:off x="1251331" y="3148491"/>
+              <a:ext cx="1545984" cy="0"/>
+            </a:xfrm>
+            <a:prstGeom prst="line">
+              <a:avLst/>
+            </a:prstGeom>
+            <a:ln w="57150">
+              <a:solidFill>
+                <a:schemeClr val="tx2">
+                  <a:lumMod val="75000"/>
+                  <a:lumOff val="25000"/>
+                </a:schemeClr>
+              </a:solidFill>
+            </a:ln>
+          </p:spPr>
+          <p:style>
+            <a:lnRef idx="2">
+              <a:schemeClr val="dk1"/>
+            </a:lnRef>
+            <a:fillRef idx="0">
+              <a:schemeClr val="dk1"/>
+            </a:fillRef>
+            <a:effectRef idx="1">
+              <a:schemeClr val="dk1"/>
+            </a:effectRef>
+            <a:fontRef idx="minor">
+              <a:schemeClr val="tx1"/>
+            </a:fontRef>
+          </p:style>
+        </p:cxnSp>
+        <p:sp>
+          <p:nvSpPr>
+            <p:cNvPr id="7" name="Oval 6">
+              <a:extLst>
+                <a:ext uri="{FF2B5EF4-FFF2-40B4-BE49-F238E27FC236}">
+                  <a16:creationId xmlns:a16="http://schemas.microsoft.com/office/drawing/2014/main" id="{0DB6F6EF-3AD9-68E3-B5CC-5F99CFBA561F}"/>
+                </a:ext>
+              </a:extLst>
+            </p:cNvPr>
+            <p:cNvSpPr/>
+            <p:nvPr/>
+          </p:nvSpPr>
+          <p:spPr>
+            <a:xfrm>
+              <a:off x="4189805" y="3148491"/>
+              <a:ext cx="268785" cy="287394"/>
+            </a:xfrm>
+            <a:prstGeom prst="ellipse">
+              <a:avLst/>
+            </a:prstGeom>
+            <a:solidFill>
+              <a:schemeClr val="dk1"/>
+            </a:solidFill>
+            <a:ln>
+              <a:noFill/>
+            </a:ln>
+          </p:spPr>
+          <p:style>
+            <a:lnRef idx="0">
+              <a:scrgbClr r="0" g="0" b="0"/>
+            </a:lnRef>
+            <a:fillRef idx="0">
+              <a:scrgbClr r="0" g="0" b="0"/>
+            </a:fillRef>
+            <a:effectRef idx="0">
+              <a:scrgbClr r="0" g="0" b="0"/>
+            </a:effectRef>
+            <a:fontRef idx="minor">
+              <a:schemeClr val="lt1"/>
+            </a:fontRef>
+          </p:style>
+          <p:txBody>
+            <a:bodyPr rtlCol="0" anchor="ctr"/>
+            <a:lstStyle/>
+            <a:p>
+              <a:pPr algn="ctr"/>
+              <a:endParaRPr lang="en-US" dirty="0"/>
+            </a:p>
+          </p:txBody>
+        </p:sp>
+        <p:sp>
+          <p:nvSpPr>
+            <p:cNvPr id="8" name="Isosceles Triangle 7">
+              <a:extLst>
+                <a:ext uri="{FF2B5EF4-FFF2-40B4-BE49-F238E27FC236}">
+                  <a16:creationId xmlns:a16="http://schemas.microsoft.com/office/drawing/2014/main" id="{C8830986-FA06-8B67-7806-1624C2C03004}"/>
+                </a:ext>
+              </a:extLst>
+            </p:cNvPr>
+            <p:cNvSpPr/>
+            <p:nvPr/>
+          </p:nvSpPr>
+          <p:spPr>
+            <a:xfrm>
+              <a:off x="1277620" y="3148491"/>
+              <a:ext cx="246888" cy="261741"/>
+            </a:xfrm>
+            <a:prstGeom prst="triangle">
+              <a:avLst/>
+            </a:prstGeom>
+            <a:solidFill>
+              <a:schemeClr val="dk1"/>
+            </a:solidFill>
+            <a:ln>
+              <a:noFill/>
+            </a:ln>
+          </p:spPr>
+          <p:style>
+            <a:lnRef idx="0">
+              <a:scrgbClr r="0" g="0" b="0"/>
+            </a:lnRef>
+            <a:fillRef idx="0">
+              <a:scrgbClr r="0" g="0" b="0"/>
+            </a:fillRef>
+            <a:effectRef idx="0">
+              <a:scrgbClr r="0" g="0" b="0"/>
+            </a:effectRef>
+            <a:fontRef idx="minor">
+              <a:schemeClr val="lt1"/>
+            </a:fontRef>
+          </p:style>
+          <p:txBody>
+            <a:bodyPr rtlCol="0" anchor="ctr"/>
+            <a:lstStyle/>
+            <a:p>
+              <a:pPr algn="ctr"/>
+              <a:endParaRPr lang="en-US"/>
+            </a:p>
+          </p:txBody>
+        </p:sp>
+        <p:cxnSp>
+          <p:nvCxnSpPr>
+            <p:cNvPr id="9" name="Straight Arrow Connector 8">
+              <a:extLst>
+                <a:ext uri="{FF2B5EF4-FFF2-40B4-BE49-F238E27FC236}">
+                  <a16:creationId xmlns:a16="http://schemas.microsoft.com/office/drawing/2014/main" id="{D740EC8C-D99B-21A9-B378-89D858E71012}"/>
+                </a:ext>
+              </a:extLst>
+            </p:cNvPr>
+            <p:cNvCxnSpPr/>
+            <p:nvPr/>
+          </p:nvCxnSpPr>
+          <p:spPr>
+            <a:xfrm>
+              <a:off x="2797315" y="2188372"/>
+              <a:ext cx="0" cy="960120"/>
+            </a:xfrm>
+            <a:prstGeom prst="straightConnector1">
+              <a:avLst/>
+            </a:prstGeom>
+            <a:ln w="38100">
+              <a:tailEnd type="triangle"/>
+            </a:ln>
+          </p:spPr>
+          <p:style>
+            <a:lnRef idx="1">
+              <a:schemeClr val="dk1"/>
+            </a:lnRef>
+            <a:fillRef idx="0">
+              <a:schemeClr val="dk1"/>
+            </a:fillRef>
+            <a:effectRef idx="0">
+              <a:schemeClr val="dk1"/>
+            </a:effectRef>
+            <a:fontRef idx="minor">
+              <a:schemeClr val="tx1"/>
+            </a:fontRef>
+          </p:style>
+        </p:cxnSp>
+        <p:cxnSp>
+          <p:nvCxnSpPr>
+            <p:cNvPr id="10" name="Straight Connector 9">
+              <a:extLst>
+                <a:ext uri="{FF2B5EF4-FFF2-40B4-BE49-F238E27FC236}">
+                  <a16:creationId xmlns:a16="http://schemas.microsoft.com/office/drawing/2014/main" id="{F1D5C093-87B7-805D-3976-ADEB94F07E32}"/>
+                </a:ext>
+              </a:extLst>
+            </p:cNvPr>
+            <p:cNvCxnSpPr>
+              <a:cxnSpLocks/>
+            </p:cNvCxnSpPr>
+            <p:nvPr/>
+          </p:nvCxnSpPr>
+          <p:spPr>
+            <a:xfrm>
+              <a:off x="1392891" y="3664365"/>
+              <a:ext cx="2907792" cy="0"/>
+            </a:xfrm>
+            <a:prstGeom prst="line">
+              <a:avLst/>
+            </a:prstGeom>
+          </p:spPr>
+          <p:style>
+            <a:lnRef idx="2">
+              <a:schemeClr val="dk1"/>
+            </a:lnRef>
+            <a:fillRef idx="0">
+              <a:schemeClr val="dk1"/>
+            </a:fillRef>
+            <a:effectRef idx="1">
+              <a:schemeClr val="dk1"/>
+            </a:effectRef>
+            <a:fontRef idx="minor">
+              <a:schemeClr val="tx1"/>
+            </a:fontRef>
+          </p:style>
+        </p:cxnSp>
+        <p:sp>
+          <p:nvSpPr>
+            <p:cNvPr id="11" name="TextBox 10">
+              <a:extLst>
+                <a:ext uri="{FF2B5EF4-FFF2-40B4-BE49-F238E27FC236}">
+                  <a16:creationId xmlns:a16="http://schemas.microsoft.com/office/drawing/2014/main" id="{7F547F64-4C2E-B5DF-EB35-0110984F2409}"/>
+                </a:ext>
+              </a:extLst>
+            </p:cNvPr>
+            <p:cNvSpPr txBox="1"/>
+            <p:nvPr/>
+          </p:nvSpPr>
+          <p:spPr>
+            <a:xfrm>
+              <a:off x="2692874" y="3684664"/>
+              <a:ext cx="216071" cy="236201"/>
+            </a:xfrm>
+            <a:prstGeom prst="rect">
+              <a:avLst/>
+            </a:prstGeom>
+            <a:noFill/>
+          </p:spPr>
+          <p:txBody>
+            <a:bodyPr wrap="none" rtlCol="0">
+              <a:spAutoFit/>
+            </a:bodyPr>
+            <a:lstStyle/>
+            <a:p>
+              <a:r>
+                <a:rPr lang="en-US" sz="1200" dirty="0">
+                  <a:latin typeface="+mj-lt"/>
+                </a:rPr>
+                <a:t>L</a:t>
+              </a:r>
+            </a:p>
+          </p:txBody>
+        </p:sp>
+        <p:sp>
+          <p:nvSpPr>
+            <p:cNvPr id="12" name="TextBox 11">
+              <a:extLst>
+                <a:ext uri="{FF2B5EF4-FFF2-40B4-BE49-F238E27FC236}">
+                  <a16:creationId xmlns:a16="http://schemas.microsoft.com/office/drawing/2014/main" id="{13738A99-0D2A-978F-8E40-4ABD0A2E3B38}"/>
+                </a:ext>
+              </a:extLst>
+            </p:cNvPr>
+            <p:cNvSpPr txBox="1"/>
+            <p:nvPr/>
+          </p:nvSpPr>
+          <p:spPr>
+            <a:xfrm>
+              <a:off x="2693000" y="1945303"/>
+              <a:ext cx="208629" cy="236201"/>
+            </a:xfrm>
+            <a:prstGeom prst="rect">
+              <a:avLst/>
+            </a:prstGeom>
+            <a:noFill/>
+          </p:spPr>
+          <p:txBody>
+            <a:bodyPr wrap="none" rtlCol="0">
+              <a:spAutoFit/>
+            </a:bodyPr>
+            <a:lstStyle/>
+            <a:p>
+              <a:r>
+                <a:rPr lang="en-US" sz="1200" dirty="0">
+                  <a:latin typeface="+mj-lt"/>
+                </a:rPr>
+                <a:t>P</a:t>
+              </a:r>
+            </a:p>
+          </p:txBody>
+        </p:sp>
+        <p:sp>
+          <p:nvSpPr>
+            <p:cNvPr id="13" name="Freeform: Shape 12">
+              <a:extLst>
+                <a:ext uri="{FF2B5EF4-FFF2-40B4-BE49-F238E27FC236}">
+                  <a16:creationId xmlns:a16="http://schemas.microsoft.com/office/drawing/2014/main" id="{3A37CA55-F67F-7A8E-C13E-3A402695FC4C}"/>
+                </a:ext>
+              </a:extLst>
+            </p:cNvPr>
+            <p:cNvSpPr/>
+            <p:nvPr/>
+          </p:nvSpPr>
+          <p:spPr>
+            <a:xfrm>
+              <a:off x="1435608" y="3168789"/>
+              <a:ext cx="2812415" cy="397404"/>
+            </a:xfrm>
+            <a:custGeom>
+              <a:avLst/>
+              <a:gdLst>
+                <a:gd name="csX0" fmla="*/ 0 w 2889504"/>
+                <a:gd name="csY0" fmla="*/ 18288 h 420657"/>
+                <a:gd name="csX1" fmla="*/ 1399032 w 2889504"/>
+                <a:gd name="csY1" fmla="*/ 420624 h 420657"/>
+                <a:gd name="csX2" fmla="*/ 2889504 w 2889504"/>
+                <a:gd name="csY2" fmla="*/ 0 h 420657"/>
+              </a:gdLst>
+              <a:ahLst/>
+              <a:cxnLst>
+                <a:cxn ang="0">
+                  <a:pos x="csX0" y="csY0"/>
+                </a:cxn>
+                <a:cxn ang="0">
+                  <a:pos x="csX1" y="csY1"/>
+                </a:cxn>
+                <a:cxn ang="0">
+                  <a:pos x="csX2" y="csY2"/>
+                </a:cxn>
+              </a:cxnLst>
+              <a:rect l="l" t="t" r="r" b="b"/>
+              <a:pathLst>
+                <a:path w="2889504" h="420657">
+                  <a:moveTo>
+                    <a:pt x="0" y="18288"/>
+                  </a:moveTo>
+                  <a:cubicBezTo>
+                    <a:pt x="458724" y="220980"/>
+                    <a:pt x="917448" y="423672"/>
+                    <a:pt x="1399032" y="420624"/>
+                  </a:cubicBezTo>
+                  <a:cubicBezTo>
+                    <a:pt x="1880616" y="417576"/>
+                    <a:pt x="2631948" y="92964"/>
+                    <a:pt x="2889504" y="0"/>
+                  </a:cubicBezTo>
+                </a:path>
+              </a:pathLst>
+            </a:custGeom>
+            <a:ln w="28575">
+              <a:solidFill>
+                <a:schemeClr val="tx1"/>
+              </a:solidFill>
+              <a:prstDash val="sysDash"/>
+            </a:ln>
+          </p:spPr>
+          <p:style>
+            <a:lnRef idx="1">
+              <a:schemeClr val="accent4"/>
+            </a:lnRef>
+            <a:fillRef idx="0">
+              <a:schemeClr val="accent4"/>
+            </a:fillRef>
+            <a:effectRef idx="0">
+              <a:schemeClr val="accent4"/>
+            </a:effectRef>
+            <a:fontRef idx="minor">
+              <a:schemeClr val="tx1"/>
+            </a:fontRef>
+          </p:style>
+          <p:txBody>
+            <a:bodyPr rtlCol="0" anchor="ctr"/>
+            <a:lstStyle/>
+            <a:p>
+              <a:pPr algn="ctr"/>
+              <a:endParaRPr lang="en-US" dirty="0"/>
+            </a:p>
+          </p:txBody>
+        </p:sp>
+        <mc:AlternateContent xmlns:mc="http://schemas.openxmlformats.org/markup-compatibility/2006">
+          <mc:Choice xmlns:a14="http://schemas.microsoft.com/office/drawing/2010/main" Requires="a14">
+            <p:sp>
+              <p:nvSpPr>
+                <p:cNvPr id="14" name="TextBox 13">
+                  <a:extLst>
+                    <a:ext uri="{FF2B5EF4-FFF2-40B4-BE49-F238E27FC236}">
+                      <a16:creationId xmlns:a16="http://schemas.microsoft.com/office/drawing/2014/main" id="{C79233F3-98B1-A932-85B8-AE73E8F32EFE}"/>
+                    </a:ext>
+                  </a:extLst>
+                </p:cNvPr>
+                <p:cNvSpPr txBox="1"/>
+                <p:nvPr/>
+              </p:nvSpPr>
+              <p:spPr>
+                <a:xfrm>
+                  <a:off x="2773259" y="3220756"/>
+                  <a:ext cx="414776" cy="236201"/>
+                </a:xfrm>
+                <a:prstGeom prst="rect">
+                  <a:avLst/>
+                </a:prstGeom>
+                <a:noFill/>
+              </p:spPr>
+              <p:txBody>
+                <a:bodyPr wrap="none" rtlCol="0">
+                  <a:spAutoFit/>
+                </a:bodyPr>
+                <a:lstStyle/>
+                <a:p>
+                  <a:pPr/>
+                  <a14:m>
+                    <m:oMathPara xmlns:m="http://schemas.openxmlformats.org/officeDocument/2006/math">
+                      <m:oMathParaPr>
+                        <m:jc m:val="centerGroup"/>
+                      </m:oMathParaPr>
+                      <m:oMath xmlns:m="http://schemas.openxmlformats.org/officeDocument/2006/math">
+                        <m:sSub>
+                          <m:sSubPr>
+                            <m:ctrlPr>
+                              <a:rPr lang="en-US" sz="1200" b="0" i="1" smtClean="0">
+                                <a:solidFill>
+                                  <a:schemeClr val="tx1"/>
+                                </a:solidFill>
+                                <a:latin typeface="Cambria Math" panose="02040503050406030204" pitchFamily="18" charset="0"/>
+                              </a:rPr>
+                            </m:ctrlPr>
+                          </m:sSubPr>
+                          <m:e>
+                            <m:r>
+                              <a:rPr lang="en-US" sz="1200" b="0" i="1" smtClean="0">
+                                <a:solidFill>
+                                  <a:schemeClr val="tx1"/>
+                                </a:solidFill>
+                                <a:latin typeface="Cambria Math" panose="02040503050406030204" pitchFamily="18" charset="0"/>
+                              </a:rPr>
+                              <m:t>𝛿</m:t>
+                            </m:r>
+                          </m:e>
+                          <m:sub>
+                            <m:r>
+                              <m:rPr>
+                                <m:sty m:val="p"/>
+                              </m:rPr>
+                              <a:rPr lang="en-US" sz="1200" b="0" i="0" smtClean="0">
+                                <a:solidFill>
+                                  <a:schemeClr val="tx1"/>
+                                </a:solidFill>
+                                <a:latin typeface="Cambria Math" panose="02040503050406030204" pitchFamily="18" charset="0"/>
+                              </a:rPr>
+                              <m:t>max</m:t>
+                            </m:r>
+                          </m:sub>
+                        </m:sSub>
+                      </m:oMath>
+                    </m:oMathPara>
+                  </a14:m>
+                  <a:endParaRPr lang="en-US" sz="1200" dirty="0">
+                    <a:solidFill>
+                      <a:schemeClr val="tx1"/>
+                    </a:solidFill>
+                    <a:latin typeface="+mj-lt"/>
+                  </a:endParaRPr>
+                </a:p>
+              </p:txBody>
+            </p:sp>
+          </mc:Choice>
+          <mc:Fallback>
+            <p:sp>
+              <p:nvSpPr>
+                <p:cNvPr id="14" name="TextBox 13">
+                  <a:extLst>
+                    <a:ext uri="{FF2B5EF4-FFF2-40B4-BE49-F238E27FC236}">
+                      <a16:creationId xmlns:a16="http://schemas.microsoft.com/office/drawing/2014/main" id="{C79233F3-98B1-A932-85B8-AE73E8F32EFE}"/>
+                    </a:ext>
+                  </a:extLst>
+                </p:cNvPr>
+                <p:cNvSpPr txBox="1">
+                  <a:spLocks noRot="1" noChangeAspect="1" noMove="1" noResize="1" noEditPoints="1" noAdjustHandles="1" noChangeArrowheads="1" noChangeShapeType="1" noTextEdit="1"/>
+                </p:cNvSpPr>
+                <p:nvPr/>
+              </p:nvSpPr>
+              <p:spPr>
+                <a:xfrm>
+                  <a:off x="2773259" y="3220756"/>
+                  <a:ext cx="414776" cy="236201"/>
+                </a:xfrm>
+                <a:prstGeom prst="rect">
+                  <a:avLst/>
+                </a:prstGeom>
+                <a:blipFill>
+                  <a:blip r:embed="rId2"/>
+                  <a:stretch>
+                    <a:fillRect/>
+                  </a:stretch>
+                </a:blipFill>
+              </p:spPr>
+              <p:txBody>
+                <a:bodyPr/>
+                <a:lstStyle/>
+                <a:p>
+                  <a:r>
+                    <a:rPr lang="en-US">
+                      <a:noFill/>
+                    </a:rPr>
+                    <a:t> </a:t>
+                  </a:r>
+                </a:p>
+              </p:txBody>
+            </p:sp>
+          </mc:Fallback>
+        </mc:AlternateContent>
+        <p:cxnSp>
+          <p:nvCxnSpPr>
+            <p:cNvPr id="15" name="Straight Connector 14">
+              <a:extLst>
+                <a:ext uri="{FF2B5EF4-FFF2-40B4-BE49-F238E27FC236}">
+                  <a16:creationId xmlns:a16="http://schemas.microsoft.com/office/drawing/2014/main" id="{391AD9D6-CC2A-0E2F-448A-18E8127653F6}"/>
+                </a:ext>
+              </a:extLst>
+            </p:cNvPr>
+            <p:cNvCxnSpPr/>
+            <p:nvPr/>
+          </p:nvCxnSpPr>
+          <p:spPr>
+            <a:xfrm>
+              <a:off x="1393653" y="3560626"/>
+              <a:ext cx="0" cy="207478"/>
+            </a:xfrm>
+            <a:prstGeom prst="line">
+              <a:avLst/>
+            </a:prstGeom>
+          </p:spPr>
+          <p:style>
+            <a:lnRef idx="2">
+              <a:schemeClr val="dk1"/>
+            </a:lnRef>
+            <a:fillRef idx="0">
+              <a:schemeClr val="dk1"/>
+            </a:fillRef>
+            <a:effectRef idx="1">
+              <a:schemeClr val="dk1"/>
+            </a:effectRef>
+            <a:fontRef idx="minor">
+              <a:schemeClr val="tx1"/>
+            </a:fontRef>
+          </p:style>
+        </p:cxnSp>
+        <p:cxnSp>
+          <p:nvCxnSpPr>
+            <p:cNvPr id="16" name="Straight Connector 15">
+              <a:extLst>
+                <a:ext uri="{FF2B5EF4-FFF2-40B4-BE49-F238E27FC236}">
+                  <a16:creationId xmlns:a16="http://schemas.microsoft.com/office/drawing/2014/main" id="{5D34F5F5-FE59-1F76-2507-A20617E1E4AB}"/>
+                </a:ext>
+              </a:extLst>
+            </p:cNvPr>
+            <p:cNvCxnSpPr/>
+            <p:nvPr/>
+          </p:nvCxnSpPr>
+          <p:spPr>
+            <a:xfrm>
+              <a:off x="4300683" y="3560626"/>
+              <a:ext cx="0" cy="207478"/>
+            </a:xfrm>
+            <a:prstGeom prst="line">
+              <a:avLst/>
+            </a:prstGeom>
+          </p:spPr>
+          <p:style>
+            <a:lnRef idx="2">
+              <a:schemeClr val="dk1"/>
+            </a:lnRef>
+            <a:fillRef idx="0">
+              <a:schemeClr val="dk1"/>
+            </a:fillRef>
+            <a:effectRef idx="1">
+              <a:schemeClr val="dk1"/>
+            </a:effectRef>
+            <a:fontRef idx="minor">
+              <a:schemeClr val="tx1"/>
+            </a:fontRef>
+          </p:style>
+        </p:cxnSp>
+        <p:cxnSp>
+          <p:nvCxnSpPr>
+            <p:cNvPr id="17" name="Straight Connector 16">
+              <a:extLst>
+                <a:ext uri="{FF2B5EF4-FFF2-40B4-BE49-F238E27FC236}">
+                  <a16:creationId xmlns:a16="http://schemas.microsoft.com/office/drawing/2014/main" id="{A17185B8-618D-50E9-9F67-C3F81D35F952}"/>
+                </a:ext>
+              </a:extLst>
+            </p:cNvPr>
+            <p:cNvCxnSpPr>
+              <a:cxnSpLocks/>
+              <a:endCxn id="13" idx="1"/>
+            </p:cNvCxnSpPr>
+            <p:nvPr/>
+          </p:nvCxnSpPr>
+          <p:spPr>
+            <a:xfrm>
+              <a:off x="2797315" y="3168789"/>
+              <a:ext cx="0" cy="397373"/>
+            </a:xfrm>
+            <a:prstGeom prst="line">
+              <a:avLst/>
+            </a:prstGeom>
+            <a:ln w="9525">
+              <a:solidFill>
+                <a:schemeClr val="tx1"/>
+              </a:solidFill>
+              <a:prstDash val="dash"/>
+            </a:ln>
+          </p:spPr>
+          <p:style>
+            <a:lnRef idx="2">
+              <a:schemeClr val="accent4"/>
+            </a:lnRef>
+            <a:fillRef idx="0">
+              <a:schemeClr val="accent4"/>
+            </a:fillRef>
+            <a:effectRef idx="1">
+              <a:schemeClr val="accent4"/>
+            </a:effectRef>
+            <a:fontRef idx="minor">
+              <a:schemeClr val="tx1"/>
+            </a:fontRef>
+          </p:style>
+        </p:cxnSp>
+      </p:grpSp>
+      <p:cxnSp>
+        <p:nvCxnSpPr>
+          <p:cNvPr id="19" name="Straight Connector 18">
+            <a:extLst>
+              <a:ext uri="{FF2B5EF4-FFF2-40B4-BE49-F238E27FC236}">
+                <a16:creationId xmlns:a16="http://schemas.microsoft.com/office/drawing/2014/main" id="{FEC3865A-B98A-6E65-48C9-7DCAD8440588}"/>
+              </a:ext>
+            </a:extLst>
+          </p:cNvPr>
+          <p:cNvCxnSpPr>
+            <a:cxnSpLocks/>
+          </p:cNvCxnSpPr>
+          <p:nvPr/>
+        </p:nvCxnSpPr>
+        <p:spPr>
+          <a:xfrm>
+            <a:off x="6021501" y="3681613"/>
+            <a:ext cx="1997982" cy="0"/>
+          </a:xfrm>
+          <a:prstGeom prst="line">
+            <a:avLst/>
+          </a:prstGeom>
+          <a:ln w="57150">
+            <a:solidFill>
+              <a:schemeClr val="accent1">
+                <a:lumMod val="60000"/>
+                <a:lumOff val="40000"/>
+              </a:schemeClr>
+            </a:solidFill>
+          </a:ln>
+        </p:spPr>
+        <p:style>
+          <a:lnRef idx="2">
+            <a:schemeClr val="dk1"/>
+          </a:lnRef>
+          <a:fillRef idx="0">
+            <a:schemeClr val="dk1"/>
+          </a:fillRef>
+          <a:effectRef idx="1">
+            <a:schemeClr val="dk1"/>
+          </a:effectRef>
+          <a:fontRef idx="minor">
+            <a:schemeClr val="tx1"/>
+          </a:fontRef>
+        </p:style>
+      </p:cxnSp>
     </p:spTree>
     <p:extLst>
       <p:ext uri="{BB962C8B-B14F-4D97-AF65-F5344CB8AC3E}">

</xml_diff>